<commit_message>
Add new ppts and Update scale
</commit_message>
<xml_diff>
--- a/主愛我.pptx
+++ b/主愛我.pptx
@@ -2,13 +2,13 @@
 <file path=ppt/presentation.xml><?xml version="1.0" encoding="utf-8"?>
 <p:presentation xmlns:a="http://schemas.openxmlformats.org/drawingml/2006/main" xmlns:r="http://schemas.openxmlformats.org/officeDocument/2006/relationships" xmlns:p="http://schemas.openxmlformats.org/presentationml/2006/main" saveSubsetFonts="1">
   <p:sldMasterIdLst>
-    <p:sldMasterId id="2147483660" r:id="rId1"/>
+    <p:sldMasterId id="2147483672" r:id="rId1"/>
   </p:sldMasterIdLst>
   <p:sldIdLst>
     <p:sldId id="257" r:id="rId2"/>
     <p:sldId id="258" r:id="rId3"/>
   </p:sldIdLst>
-  <p:sldSz cx="9144000" cy="6858000" type="screen4x3"/>
+  <p:sldSz cx="9144000" cy="5143500" type="screen16x9"/>
   <p:notesSz cx="6858000" cy="9144000"/>
   <p:defaultTextStyle>
     <a:defPPr>
@@ -127,7 +127,7 @@
       </p:grpSpPr>
       <p:sp>
         <p:nvSpPr>
-          <p:cNvPr id="2" name="Title 1"/>
+          <p:cNvPr id="2" name="標題 1"/>
           <p:cNvSpPr>
             <a:spLocks noGrp="1"/>
           </p:cNvSpPr>
@@ -137,31 +137,25 @@
         </p:nvSpPr>
         <p:spPr>
           <a:xfrm>
-            <a:off x="685800" y="2130425"/>
-            <a:ext cx="7772400" cy="1470025"/>
+            <a:off x="685800" y="1597819"/>
+            <a:ext cx="7772400" cy="1102519"/>
           </a:xfrm>
         </p:spPr>
         <p:txBody>
-          <a:bodyPr>
-            <a:noAutofit/>
-          </a:bodyPr>
-          <a:lstStyle>
-            <a:lvl1pPr algn="ctr">
-              <a:defRPr sz="5400"/>
-            </a:lvl1pPr>
-          </a:lstStyle>
-          <a:p>
-            <a:r>
-              <a:rPr lang="zh-TW" altLang="en-US" smtClean="0"/>
-              <a:t>按一下以編輯母片標題樣式</a:t>
-            </a:r>
-            <a:endParaRPr lang="en-US"/>
-          </a:p>
-        </p:txBody>
-      </p:sp>
-      <p:sp>
-        <p:nvSpPr>
-          <p:cNvPr id="3" name="Subtitle 2"/>
+          <a:bodyPr/>
+          <a:lstStyle/>
+          <a:p>
+            <a:r>
+              <a:rPr lang="en-US" altLang="zh-TW" smtClean="0"/>
+              <a:t>Click to edit Master title style</a:t>
+            </a:r>
+            <a:endParaRPr lang="zh-TW" altLang="en-US"/>
+          </a:p>
+        </p:txBody>
+      </p:sp>
+      <p:sp>
+        <p:nvSpPr>
+          <p:cNvPr id="3" name="副標題 2"/>
           <p:cNvSpPr>
             <a:spLocks noGrp="1"/>
           </p:cNvSpPr>
@@ -171,20 +165,20 @@
         </p:nvSpPr>
         <p:spPr>
           <a:xfrm>
-            <a:off x="1371600" y="3886200"/>
-            <a:ext cx="6400800" cy="1752600"/>
+            <a:off x="1371600" y="2914650"/>
+            <a:ext cx="6400800" cy="1314450"/>
           </a:xfrm>
         </p:spPr>
         <p:txBody>
-          <a:bodyPr>
-            <a:normAutofit/>
-          </a:bodyPr>
+          <a:bodyPr/>
           <a:lstStyle>
             <a:lvl1pPr marL="0" indent="0" algn="ctr">
               <a:buNone/>
-              <a:defRPr sz="2400">
+              <a:defRPr>
                 <a:solidFill>
-                  <a:schemeClr val="tx1"/>
+                  <a:schemeClr val="tx1">
+                    <a:tint val="75000"/>
+                  </a:schemeClr>
                 </a:solidFill>
               </a:defRPr>
             </a:lvl1pPr>
@@ -271,16 +265,16 @@
           </a:lstStyle>
           <a:p>
             <a:r>
-              <a:rPr lang="zh-TW" altLang="en-US" smtClean="0"/>
-              <a:t>按一下以編輯母片副標題樣式</a:t>
-            </a:r>
-            <a:endParaRPr lang="en-US"/>
-          </a:p>
-        </p:txBody>
-      </p:sp>
-      <p:sp>
-        <p:nvSpPr>
-          <p:cNvPr id="4" name="Date Placeholder 3"/>
+              <a:rPr lang="en-US" altLang="zh-TW" smtClean="0"/>
+              <a:t>Click to edit Master subtitle style</a:t>
+            </a:r>
+            <a:endParaRPr lang="zh-TW" altLang="en-US"/>
+          </a:p>
+        </p:txBody>
+      </p:sp>
+      <p:sp>
+        <p:nvSpPr>
+          <p:cNvPr id="4" name="日期版面配置區 3"/>
           <p:cNvSpPr>
             <a:spLocks noGrp="1"/>
           </p:cNvSpPr>
@@ -295,7 +289,7 @@
           <a:p>
             <a:fld id="{1B95BEA9-D391-447B-A819-7D2A28D2C1E7}" type="datetimeFigureOut">
               <a:rPr lang="zh-TW" altLang="en-US" smtClean="0"/>
-              <a:t>2013/5/18</a:t>
+              <a:t>2019/9/7</a:t>
             </a:fld>
             <a:endParaRPr lang="zh-TW" altLang="en-US"/>
           </a:p>
@@ -303,7 +297,7 @@
       </p:sp>
       <p:sp>
         <p:nvSpPr>
-          <p:cNvPr id="5" name="Footer Placeholder 4"/>
+          <p:cNvPr id="5" name="頁尾版面配置區 4"/>
           <p:cNvSpPr>
             <a:spLocks noGrp="1"/>
           </p:cNvSpPr>
@@ -322,7 +316,7 @@
       </p:sp>
       <p:sp>
         <p:nvSpPr>
-          <p:cNvPr id="6" name="Slide Number Placeholder 5"/>
+          <p:cNvPr id="6" name="投影片編號版面配置區 5"/>
           <p:cNvSpPr>
             <a:spLocks noGrp="1"/>
           </p:cNvSpPr>
@@ -370,7 +364,7 @@
       </p:grpSpPr>
       <p:sp>
         <p:nvSpPr>
-          <p:cNvPr id="2" name="Title 1"/>
+          <p:cNvPr id="2" name="標題 1"/>
           <p:cNvSpPr>
             <a:spLocks noGrp="1"/>
           </p:cNvSpPr>
@@ -384,16 +378,16 @@
           <a:lstStyle/>
           <a:p>
             <a:r>
-              <a:rPr lang="zh-TW" altLang="en-US" smtClean="0"/>
-              <a:t>按一下以編輯母片標題樣式</a:t>
-            </a:r>
-            <a:endParaRPr lang="en-US"/>
-          </a:p>
-        </p:txBody>
-      </p:sp>
-      <p:sp>
-        <p:nvSpPr>
-          <p:cNvPr id="3" name="Vertical Text Placeholder 2"/>
+              <a:rPr lang="en-US" altLang="zh-TW" smtClean="0"/>
+              <a:t>Click to edit Master title style</a:t>
+            </a:r>
+            <a:endParaRPr lang="zh-TW" altLang="en-US"/>
+          </a:p>
+        </p:txBody>
+      </p:sp>
+      <p:sp>
+        <p:nvSpPr>
+          <p:cNvPr id="3" name="直排文字版面配置區 2"/>
           <p:cNvSpPr>
             <a:spLocks noGrp="1"/>
           </p:cNvSpPr>
@@ -408,44 +402,44 @@
           <a:p>
             <a:pPr lvl="0"/>
             <a:r>
-              <a:rPr lang="zh-TW" altLang="en-US" smtClean="0"/>
-              <a:t>按一下以編輯母片文字樣式</a:t>
+              <a:rPr lang="en-US" altLang="zh-TW" smtClean="0"/>
+              <a:t>Click to edit Master text styles</a:t>
             </a:r>
           </a:p>
           <a:p>
             <a:pPr lvl="1"/>
             <a:r>
-              <a:rPr lang="zh-TW" altLang="en-US" smtClean="0"/>
-              <a:t>第二層</a:t>
+              <a:rPr lang="en-US" altLang="zh-TW" smtClean="0"/>
+              <a:t>Second level</a:t>
             </a:r>
           </a:p>
           <a:p>
             <a:pPr lvl="2"/>
             <a:r>
-              <a:rPr lang="zh-TW" altLang="en-US" smtClean="0"/>
-              <a:t>第三層</a:t>
+              <a:rPr lang="en-US" altLang="zh-TW" smtClean="0"/>
+              <a:t>Third level</a:t>
             </a:r>
           </a:p>
           <a:p>
             <a:pPr lvl="3"/>
             <a:r>
-              <a:rPr lang="zh-TW" altLang="en-US" smtClean="0"/>
-              <a:t>第四層</a:t>
+              <a:rPr lang="en-US" altLang="zh-TW" smtClean="0"/>
+              <a:t>Fourth level</a:t>
             </a:r>
           </a:p>
           <a:p>
             <a:pPr lvl="4"/>
             <a:r>
-              <a:rPr lang="zh-TW" altLang="en-US" smtClean="0"/>
-              <a:t>第五層</a:t>
-            </a:r>
-            <a:endParaRPr lang="en-US"/>
-          </a:p>
-        </p:txBody>
-      </p:sp>
-      <p:sp>
-        <p:nvSpPr>
-          <p:cNvPr id="4" name="Date Placeholder 3"/>
+              <a:rPr lang="en-US" altLang="zh-TW" smtClean="0"/>
+              <a:t>Fifth level</a:t>
+            </a:r>
+            <a:endParaRPr lang="zh-TW" altLang="en-US"/>
+          </a:p>
+        </p:txBody>
+      </p:sp>
+      <p:sp>
+        <p:nvSpPr>
+          <p:cNvPr id="4" name="日期版面配置區 3"/>
           <p:cNvSpPr>
             <a:spLocks noGrp="1"/>
           </p:cNvSpPr>
@@ -460,7 +454,7 @@
           <a:p>
             <a:fld id="{1B95BEA9-D391-447B-A819-7D2A28D2C1E7}" type="datetimeFigureOut">
               <a:rPr lang="zh-TW" altLang="en-US" smtClean="0"/>
-              <a:t>2013/5/18</a:t>
+              <a:t>2019/9/7</a:t>
             </a:fld>
             <a:endParaRPr lang="zh-TW" altLang="en-US"/>
           </a:p>
@@ -468,7 +462,7 @@
       </p:sp>
       <p:sp>
         <p:nvSpPr>
-          <p:cNvPr id="5" name="Footer Placeholder 4"/>
+          <p:cNvPr id="5" name="頁尾版面配置區 4"/>
           <p:cNvSpPr>
             <a:spLocks noGrp="1"/>
           </p:cNvSpPr>
@@ -487,7 +481,7 @@
       </p:sp>
       <p:sp>
         <p:nvSpPr>
-          <p:cNvPr id="6" name="Slide Number Placeholder 5"/>
+          <p:cNvPr id="6" name="投影片編號版面配置區 5"/>
           <p:cNvSpPr>
             <a:spLocks noGrp="1"/>
           </p:cNvSpPr>
@@ -535,7 +529,7 @@
       </p:grpSpPr>
       <p:sp>
         <p:nvSpPr>
-          <p:cNvPr id="2" name="Vertical Title 1"/>
+          <p:cNvPr id="2" name="直排標題 1"/>
           <p:cNvSpPr>
             <a:spLocks noGrp="1"/>
           </p:cNvSpPr>
@@ -545,8 +539,8 @@
         </p:nvSpPr>
         <p:spPr>
           <a:xfrm>
-            <a:off x="6629400" y="274638"/>
-            <a:ext cx="2057400" cy="5851525"/>
+            <a:off x="6629400" y="205979"/>
+            <a:ext cx="2057400" cy="4388644"/>
           </a:xfrm>
         </p:spPr>
         <p:txBody>
@@ -554,16 +548,16 @@
           <a:lstStyle/>
           <a:p>
             <a:r>
-              <a:rPr lang="zh-TW" altLang="en-US" smtClean="0"/>
-              <a:t>按一下以編輯母片標題樣式</a:t>
-            </a:r>
-            <a:endParaRPr lang="en-US"/>
-          </a:p>
-        </p:txBody>
-      </p:sp>
-      <p:sp>
-        <p:nvSpPr>
-          <p:cNvPr id="3" name="Vertical Text Placeholder 2"/>
+              <a:rPr lang="en-US" altLang="zh-TW" smtClean="0"/>
+              <a:t>Click to edit Master title style</a:t>
+            </a:r>
+            <a:endParaRPr lang="zh-TW" altLang="en-US"/>
+          </a:p>
+        </p:txBody>
+      </p:sp>
+      <p:sp>
+        <p:nvSpPr>
+          <p:cNvPr id="3" name="直排文字版面配置區 2"/>
           <p:cNvSpPr>
             <a:spLocks noGrp="1"/>
           </p:cNvSpPr>
@@ -573,8 +567,8 @@
         </p:nvSpPr>
         <p:spPr>
           <a:xfrm>
-            <a:off x="457200" y="274638"/>
-            <a:ext cx="6019800" cy="5851525"/>
+            <a:off x="457200" y="205979"/>
+            <a:ext cx="6019800" cy="4388644"/>
           </a:xfrm>
         </p:spPr>
         <p:txBody>
@@ -583,44 +577,44 @@
           <a:p>
             <a:pPr lvl="0"/>
             <a:r>
-              <a:rPr lang="zh-TW" altLang="en-US" smtClean="0"/>
-              <a:t>按一下以編輯母片文字樣式</a:t>
+              <a:rPr lang="en-US" altLang="zh-TW" smtClean="0"/>
+              <a:t>Click to edit Master text styles</a:t>
             </a:r>
           </a:p>
           <a:p>
             <a:pPr lvl="1"/>
             <a:r>
-              <a:rPr lang="zh-TW" altLang="en-US" smtClean="0"/>
-              <a:t>第二層</a:t>
+              <a:rPr lang="en-US" altLang="zh-TW" smtClean="0"/>
+              <a:t>Second level</a:t>
             </a:r>
           </a:p>
           <a:p>
             <a:pPr lvl="2"/>
             <a:r>
-              <a:rPr lang="zh-TW" altLang="en-US" smtClean="0"/>
-              <a:t>第三層</a:t>
+              <a:rPr lang="en-US" altLang="zh-TW" smtClean="0"/>
+              <a:t>Third level</a:t>
             </a:r>
           </a:p>
           <a:p>
             <a:pPr lvl="3"/>
             <a:r>
-              <a:rPr lang="zh-TW" altLang="en-US" smtClean="0"/>
-              <a:t>第四層</a:t>
+              <a:rPr lang="en-US" altLang="zh-TW" smtClean="0"/>
+              <a:t>Fourth level</a:t>
             </a:r>
           </a:p>
           <a:p>
             <a:pPr lvl="4"/>
             <a:r>
-              <a:rPr lang="zh-TW" altLang="en-US" smtClean="0"/>
-              <a:t>第五層</a:t>
-            </a:r>
-            <a:endParaRPr lang="en-US"/>
-          </a:p>
-        </p:txBody>
-      </p:sp>
-      <p:sp>
-        <p:nvSpPr>
-          <p:cNvPr id="4" name="Date Placeholder 3"/>
+              <a:rPr lang="en-US" altLang="zh-TW" smtClean="0"/>
+              <a:t>Fifth level</a:t>
+            </a:r>
+            <a:endParaRPr lang="zh-TW" altLang="en-US"/>
+          </a:p>
+        </p:txBody>
+      </p:sp>
+      <p:sp>
+        <p:nvSpPr>
+          <p:cNvPr id="4" name="日期版面配置區 3"/>
           <p:cNvSpPr>
             <a:spLocks noGrp="1"/>
           </p:cNvSpPr>
@@ -635,7 +629,7 @@
           <a:p>
             <a:fld id="{1B95BEA9-D391-447B-A819-7D2A28D2C1E7}" type="datetimeFigureOut">
               <a:rPr lang="zh-TW" altLang="en-US" smtClean="0"/>
-              <a:t>2013/5/18</a:t>
+              <a:t>2019/9/7</a:t>
             </a:fld>
             <a:endParaRPr lang="zh-TW" altLang="en-US"/>
           </a:p>
@@ -643,7 +637,7 @@
       </p:sp>
       <p:sp>
         <p:nvSpPr>
-          <p:cNvPr id="5" name="Footer Placeholder 4"/>
+          <p:cNvPr id="5" name="頁尾版面配置區 4"/>
           <p:cNvSpPr>
             <a:spLocks noGrp="1"/>
           </p:cNvSpPr>
@@ -662,7 +656,7 @@
       </p:sp>
       <p:sp>
         <p:nvSpPr>
-          <p:cNvPr id="6" name="Slide Number Placeholder 5"/>
+          <p:cNvPr id="6" name="投影片編號版面配置區 5"/>
           <p:cNvSpPr>
             <a:spLocks noGrp="1"/>
           </p:cNvSpPr>
@@ -710,7 +704,7 @@
       </p:grpSpPr>
       <p:sp>
         <p:nvSpPr>
-          <p:cNvPr id="2" name="Title 1"/>
+          <p:cNvPr id="2" name="標題 1"/>
           <p:cNvSpPr>
             <a:spLocks noGrp="1"/>
           </p:cNvSpPr>
@@ -724,16 +718,16 @@
           <a:lstStyle/>
           <a:p>
             <a:r>
-              <a:rPr lang="zh-TW" altLang="en-US" smtClean="0"/>
-              <a:t>按一下以編輯母片標題樣式</a:t>
-            </a:r>
-            <a:endParaRPr lang="en-US"/>
-          </a:p>
-        </p:txBody>
-      </p:sp>
-      <p:sp>
-        <p:nvSpPr>
-          <p:cNvPr id="3" name="Content Placeholder 2"/>
+              <a:rPr lang="en-US" altLang="zh-TW" smtClean="0"/>
+              <a:t>Click to edit Master title style</a:t>
+            </a:r>
+            <a:endParaRPr lang="zh-TW" altLang="en-US"/>
+          </a:p>
+        </p:txBody>
+      </p:sp>
+      <p:sp>
+        <p:nvSpPr>
+          <p:cNvPr id="3" name="內容版面配置區 2"/>
           <p:cNvSpPr>
             <a:spLocks noGrp="1"/>
           </p:cNvSpPr>
@@ -748,44 +742,44 @@
           <a:p>
             <a:pPr lvl="0"/>
             <a:r>
-              <a:rPr lang="zh-TW" altLang="en-US" smtClean="0"/>
-              <a:t>按一下以編輯母片文字樣式</a:t>
+              <a:rPr lang="en-US" altLang="zh-TW" smtClean="0"/>
+              <a:t>Click to edit Master text styles</a:t>
             </a:r>
           </a:p>
           <a:p>
             <a:pPr lvl="1"/>
             <a:r>
-              <a:rPr lang="zh-TW" altLang="en-US" smtClean="0"/>
-              <a:t>第二層</a:t>
+              <a:rPr lang="en-US" altLang="zh-TW" smtClean="0"/>
+              <a:t>Second level</a:t>
             </a:r>
           </a:p>
           <a:p>
             <a:pPr lvl="2"/>
             <a:r>
-              <a:rPr lang="zh-TW" altLang="en-US" smtClean="0"/>
-              <a:t>第三層</a:t>
+              <a:rPr lang="en-US" altLang="zh-TW" smtClean="0"/>
+              <a:t>Third level</a:t>
             </a:r>
           </a:p>
           <a:p>
             <a:pPr lvl="3"/>
             <a:r>
-              <a:rPr lang="zh-TW" altLang="en-US" smtClean="0"/>
-              <a:t>第四層</a:t>
+              <a:rPr lang="en-US" altLang="zh-TW" smtClean="0"/>
+              <a:t>Fourth level</a:t>
             </a:r>
           </a:p>
           <a:p>
             <a:pPr lvl="4"/>
             <a:r>
-              <a:rPr lang="zh-TW" altLang="en-US" smtClean="0"/>
-              <a:t>第五層</a:t>
-            </a:r>
-            <a:endParaRPr lang="en-US"/>
-          </a:p>
-        </p:txBody>
-      </p:sp>
-      <p:sp>
-        <p:nvSpPr>
-          <p:cNvPr id="4" name="Date Placeholder 3"/>
+              <a:rPr lang="en-US" altLang="zh-TW" smtClean="0"/>
+              <a:t>Fifth level</a:t>
+            </a:r>
+            <a:endParaRPr lang="zh-TW" altLang="en-US"/>
+          </a:p>
+        </p:txBody>
+      </p:sp>
+      <p:sp>
+        <p:nvSpPr>
+          <p:cNvPr id="4" name="日期版面配置區 3"/>
           <p:cNvSpPr>
             <a:spLocks noGrp="1"/>
           </p:cNvSpPr>
@@ -800,7 +794,7 @@
           <a:p>
             <a:fld id="{1B95BEA9-D391-447B-A819-7D2A28D2C1E7}" type="datetimeFigureOut">
               <a:rPr lang="zh-TW" altLang="en-US" smtClean="0"/>
-              <a:t>2013/5/18</a:t>
+              <a:t>2019/9/7</a:t>
             </a:fld>
             <a:endParaRPr lang="zh-TW" altLang="en-US"/>
           </a:p>
@@ -808,7 +802,7 @@
       </p:sp>
       <p:sp>
         <p:nvSpPr>
-          <p:cNvPr id="5" name="Footer Placeholder 4"/>
+          <p:cNvPr id="5" name="頁尾版面配置區 4"/>
           <p:cNvSpPr>
             <a:spLocks noGrp="1"/>
           </p:cNvSpPr>
@@ -827,7 +821,7 @@
       </p:sp>
       <p:sp>
         <p:nvSpPr>
-          <p:cNvPr id="6" name="Slide Number Placeholder 5"/>
+          <p:cNvPr id="6" name="投影片編號版面配置區 5"/>
           <p:cNvSpPr>
             <a:spLocks noGrp="1"/>
           </p:cNvSpPr>
@@ -875,41 +869,39 @@
       </p:grpSpPr>
       <p:sp>
         <p:nvSpPr>
-          <p:cNvPr id="2" name="Title 1"/>
-          <p:cNvSpPr>
-            <a:spLocks noGrp="1"/>
-          </p:cNvSpPr>
-          <p:nvPr>
-            <p:ph type="title" hasCustomPrompt="1"/>
+          <p:cNvPr id="2" name="標題 1"/>
+          <p:cNvSpPr>
+            <a:spLocks noGrp="1"/>
+          </p:cNvSpPr>
+          <p:nvPr>
+            <p:ph type="title"/>
           </p:nvPr>
         </p:nvSpPr>
         <p:spPr>
           <a:xfrm>
-            <a:off x="722313" y="2871787"/>
-            <a:ext cx="7772400" cy="1362075"/>
+            <a:off x="722313" y="3305176"/>
+            <a:ext cx="7772400" cy="1021556"/>
           </a:xfrm>
         </p:spPr>
         <p:txBody>
-          <a:bodyPr anchor="t">
-            <a:noAutofit/>
-          </a:bodyPr>
+          <a:bodyPr anchor="t"/>
           <a:lstStyle>
             <a:lvl1pPr algn="l">
-              <a:defRPr sz="4400" b="1" cap="none"/>
+              <a:defRPr sz="4000" b="1" cap="all"/>
             </a:lvl1pPr>
           </a:lstStyle>
           <a:p>
             <a:r>
-              <a:rPr lang="en-US" smtClean="0"/>
-              <a:t>Click to edit master title style</a:t>
-            </a:r>
-            <a:endParaRPr lang="en-US"/>
-          </a:p>
-        </p:txBody>
-      </p:sp>
-      <p:sp>
-        <p:nvSpPr>
-          <p:cNvPr id="3" name="Text Placeholder 2"/>
+              <a:rPr lang="en-US" altLang="zh-TW" smtClean="0"/>
+              <a:t>Click to edit Master title style</a:t>
+            </a:r>
+            <a:endParaRPr lang="zh-TW" altLang="en-US"/>
+          </a:p>
+        </p:txBody>
+      </p:sp>
+      <p:sp>
+        <p:nvSpPr>
+          <p:cNvPr id="3" name="文字版面配置區 2"/>
           <p:cNvSpPr>
             <a:spLocks noGrp="1"/>
           </p:cNvSpPr>
@@ -919,8 +911,8 @@
         </p:nvSpPr>
         <p:spPr>
           <a:xfrm>
-            <a:off x="722313" y="1371600"/>
-            <a:ext cx="7772400" cy="1500187"/>
+            <a:off x="722313" y="2180035"/>
+            <a:ext cx="7772400" cy="1125140"/>
           </a:xfrm>
         </p:spPr>
         <p:txBody>
@@ -930,7 +922,9 @@
               <a:buNone/>
               <a:defRPr sz="2000">
                 <a:solidFill>
-                  <a:schemeClr val="tx1"/>
+                  <a:schemeClr val="tx1">
+                    <a:tint val="75000"/>
+                  </a:schemeClr>
                 </a:solidFill>
               </a:defRPr>
             </a:lvl1pPr>
@@ -1018,15 +1012,15 @@
           <a:p>
             <a:pPr lvl="0"/>
             <a:r>
-              <a:rPr lang="zh-TW" altLang="en-US" smtClean="0"/>
-              <a:t>按一下以編輯母片文字樣式</a:t>
-            </a:r>
-          </a:p>
-        </p:txBody>
-      </p:sp>
-      <p:sp>
-        <p:nvSpPr>
-          <p:cNvPr id="4" name="Date Placeholder 3"/>
+              <a:rPr lang="en-US" altLang="zh-TW" smtClean="0"/>
+              <a:t>Click to edit Master text styles</a:t>
+            </a:r>
+          </a:p>
+        </p:txBody>
+      </p:sp>
+      <p:sp>
+        <p:nvSpPr>
+          <p:cNvPr id="4" name="日期版面配置區 3"/>
           <p:cNvSpPr>
             <a:spLocks noGrp="1"/>
           </p:cNvSpPr>
@@ -1041,7 +1035,7 @@
           <a:p>
             <a:fld id="{1B95BEA9-D391-447B-A819-7D2A28D2C1E7}" type="datetimeFigureOut">
               <a:rPr lang="zh-TW" altLang="en-US" smtClean="0"/>
-              <a:t>2013/5/18</a:t>
+              <a:t>2019/9/7</a:t>
             </a:fld>
             <a:endParaRPr lang="zh-TW" altLang="en-US"/>
           </a:p>
@@ -1049,7 +1043,7 @@
       </p:sp>
       <p:sp>
         <p:nvSpPr>
-          <p:cNvPr id="5" name="Footer Placeholder 4"/>
+          <p:cNvPr id="5" name="頁尾版面配置區 4"/>
           <p:cNvSpPr>
             <a:spLocks noGrp="1"/>
           </p:cNvSpPr>
@@ -1068,7 +1062,7 @@
       </p:sp>
       <p:sp>
         <p:nvSpPr>
-          <p:cNvPr id="6" name="Slide Number Placeholder 5"/>
+          <p:cNvPr id="6" name="投影片編號版面配置區 5"/>
           <p:cNvSpPr>
             <a:spLocks noGrp="1"/>
           </p:cNvSpPr>
@@ -1116,7 +1110,7 @@
       </p:grpSpPr>
       <p:sp>
         <p:nvSpPr>
-          <p:cNvPr id="2" name="Title 1"/>
+          <p:cNvPr id="2" name="標題 1"/>
           <p:cNvSpPr>
             <a:spLocks noGrp="1"/>
           </p:cNvSpPr>
@@ -1130,16 +1124,16 @@
           <a:lstStyle/>
           <a:p>
             <a:r>
-              <a:rPr lang="zh-TW" altLang="en-US" smtClean="0"/>
-              <a:t>按一下以編輯母片標題樣式</a:t>
-            </a:r>
-            <a:endParaRPr lang="en-US"/>
-          </a:p>
-        </p:txBody>
-      </p:sp>
-      <p:sp>
-        <p:nvSpPr>
-          <p:cNvPr id="3" name="Content Placeholder 2"/>
+              <a:rPr lang="en-US" altLang="zh-TW" smtClean="0"/>
+              <a:t>Click to edit Master title style</a:t>
+            </a:r>
+            <a:endParaRPr lang="zh-TW" altLang="en-US"/>
+          </a:p>
+        </p:txBody>
+      </p:sp>
+      <p:sp>
+        <p:nvSpPr>
+          <p:cNvPr id="3" name="內容版面配置區 2"/>
           <p:cNvSpPr>
             <a:spLocks noGrp="1"/>
           </p:cNvSpPr>
@@ -1149,8 +1143,8 @@
         </p:nvSpPr>
         <p:spPr>
           <a:xfrm>
-            <a:off x="457200" y="1600200"/>
-            <a:ext cx="4038600" cy="4525963"/>
+            <a:off x="457200" y="1200151"/>
+            <a:ext cx="4038600" cy="3394472"/>
           </a:xfrm>
         </p:spPr>
         <p:txBody>
@@ -1187,44 +1181,44 @@
           <a:p>
             <a:pPr lvl="0"/>
             <a:r>
-              <a:rPr lang="zh-TW" altLang="en-US" smtClean="0"/>
-              <a:t>按一下以編輯母片文字樣式</a:t>
+              <a:rPr lang="en-US" altLang="zh-TW" smtClean="0"/>
+              <a:t>Click to edit Master text styles</a:t>
             </a:r>
           </a:p>
           <a:p>
             <a:pPr lvl="1"/>
             <a:r>
-              <a:rPr lang="zh-TW" altLang="en-US" smtClean="0"/>
-              <a:t>第二層</a:t>
+              <a:rPr lang="en-US" altLang="zh-TW" smtClean="0"/>
+              <a:t>Second level</a:t>
             </a:r>
           </a:p>
           <a:p>
             <a:pPr lvl="2"/>
             <a:r>
-              <a:rPr lang="zh-TW" altLang="en-US" smtClean="0"/>
-              <a:t>第三層</a:t>
+              <a:rPr lang="en-US" altLang="zh-TW" smtClean="0"/>
+              <a:t>Third level</a:t>
             </a:r>
           </a:p>
           <a:p>
             <a:pPr lvl="3"/>
             <a:r>
-              <a:rPr lang="zh-TW" altLang="en-US" smtClean="0"/>
-              <a:t>第四層</a:t>
+              <a:rPr lang="en-US" altLang="zh-TW" smtClean="0"/>
+              <a:t>Fourth level</a:t>
             </a:r>
           </a:p>
           <a:p>
             <a:pPr lvl="4"/>
             <a:r>
-              <a:rPr lang="zh-TW" altLang="en-US" smtClean="0"/>
-              <a:t>第五層</a:t>
-            </a:r>
-            <a:endParaRPr lang="en-US"/>
-          </a:p>
-        </p:txBody>
-      </p:sp>
-      <p:sp>
-        <p:nvSpPr>
-          <p:cNvPr id="4" name="Content Placeholder 3"/>
+              <a:rPr lang="en-US" altLang="zh-TW" smtClean="0"/>
+              <a:t>Fifth level</a:t>
+            </a:r>
+            <a:endParaRPr lang="zh-TW" altLang="en-US"/>
+          </a:p>
+        </p:txBody>
+      </p:sp>
+      <p:sp>
+        <p:nvSpPr>
+          <p:cNvPr id="4" name="內容版面配置區 3"/>
           <p:cNvSpPr>
             <a:spLocks noGrp="1"/>
           </p:cNvSpPr>
@@ -1234,8 +1228,8 @@
         </p:nvSpPr>
         <p:spPr>
           <a:xfrm>
-            <a:off x="4648200" y="1600200"/>
-            <a:ext cx="4038600" cy="4525963"/>
+            <a:off x="4648200" y="1200151"/>
+            <a:ext cx="4038600" cy="3394472"/>
           </a:xfrm>
         </p:spPr>
         <p:txBody>
@@ -1272,44 +1266,44 @@
           <a:p>
             <a:pPr lvl="0"/>
             <a:r>
-              <a:rPr lang="zh-TW" altLang="en-US" smtClean="0"/>
-              <a:t>按一下以編輯母片文字樣式</a:t>
+              <a:rPr lang="en-US" altLang="zh-TW" smtClean="0"/>
+              <a:t>Click to edit Master text styles</a:t>
             </a:r>
           </a:p>
           <a:p>
             <a:pPr lvl="1"/>
             <a:r>
-              <a:rPr lang="zh-TW" altLang="en-US" smtClean="0"/>
-              <a:t>第二層</a:t>
+              <a:rPr lang="en-US" altLang="zh-TW" smtClean="0"/>
+              <a:t>Second level</a:t>
             </a:r>
           </a:p>
           <a:p>
             <a:pPr lvl="2"/>
             <a:r>
-              <a:rPr lang="zh-TW" altLang="en-US" smtClean="0"/>
-              <a:t>第三層</a:t>
+              <a:rPr lang="en-US" altLang="zh-TW" smtClean="0"/>
+              <a:t>Third level</a:t>
             </a:r>
           </a:p>
           <a:p>
             <a:pPr lvl="3"/>
             <a:r>
-              <a:rPr lang="zh-TW" altLang="en-US" smtClean="0"/>
-              <a:t>第四層</a:t>
+              <a:rPr lang="en-US" altLang="zh-TW" smtClean="0"/>
+              <a:t>Fourth level</a:t>
             </a:r>
           </a:p>
           <a:p>
             <a:pPr lvl="4"/>
             <a:r>
-              <a:rPr lang="zh-TW" altLang="en-US" smtClean="0"/>
-              <a:t>第五層</a:t>
-            </a:r>
-            <a:endParaRPr lang="en-US"/>
-          </a:p>
-        </p:txBody>
-      </p:sp>
-      <p:sp>
-        <p:nvSpPr>
-          <p:cNvPr id="5" name="Date Placeholder 4"/>
+              <a:rPr lang="en-US" altLang="zh-TW" smtClean="0"/>
+              <a:t>Fifth level</a:t>
+            </a:r>
+            <a:endParaRPr lang="zh-TW" altLang="en-US"/>
+          </a:p>
+        </p:txBody>
+      </p:sp>
+      <p:sp>
+        <p:nvSpPr>
+          <p:cNvPr id="5" name="日期版面配置區 4"/>
           <p:cNvSpPr>
             <a:spLocks noGrp="1"/>
           </p:cNvSpPr>
@@ -1324,7 +1318,7 @@
           <a:p>
             <a:fld id="{1B95BEA9-D391-447B-A819-7D2A28D2C1E7}" type="datetimeFigureOut">
               <a:rPr lang="zh-TW" altLang="en-US" smtClean="0"/>
-              <a:t>2013/5/18</a:t>
+              <a:t>2019/9/7</a:t>
             </a:fld>
             <a:endParaRPr lang="zh-TW" altLang="en-US"/>
           </a:p>
@@ -1332,7 +1326,7 @@
       </p:sp>
       <p:sp>
         <p:nvSpPr>
-          <p:cNvPr id="6" name="Footer Placeholder 5"/>
+          <p:cNvPr id="6" name="頁尾版面配置區 5"/>
           <p:cNvSpPr>
             <a:spLocks noGrp="1"/>
           </p:cNvSpPr>
@@ -1351,7 +1345,7 @@
       </p:sp>
       <p:sp>
         <p:nvSpPr>
-          <p:cNvPr id="7" name="Slide Number Placeholder 6"/>
+          <p:cNvPr id="7" name="投影片編號版面配置區 6"/>
           <p:cNvSpPr>
             <a:spLocks noGrp="1"/>
           </p:cNvSpPr>
@@ -1399,7 +1393,7 @@
       </p:grpSpPr>
       <p:sp>
         <p:nvSpPr>
-          <p:cNvPr id="2" name="Title 1"/>
+          <p:cNvPr id="2" name="標題 1"/>
           <p:cNvSpPr>
             <a:spLocks noGrp="1"/>
           </p:cNvSpPr>
@@ -1417,31 +1411,31 @@
           </a:lstStyle>
           <a:p>
             <a:r>
-              <a:rPr lang="zh-TW" altLang="en-US" smtClean="0"/>
-              <a:t>按一下以編輯母片標題樣式</a:t>
-            </a:r>
-            <a:endParaRPr lang="en-US"/>
-          </a:p>
-        </p:txBody>
-      </p:sp>
-      <p:sp>
-        <p:nvSpPr>
-          <p:cNvPr id="3" name="Text Placeholder 2"/>
-          <p:cNvSpPr>
-            <a:spLocks noGrp="1"/>
-          </p:cNvSpPr>
-          <p:nvPr>
-            <p:ph type="body" idx="1" hasCustomPrompt="1"/>
+              <a:rPr lang="en-US" altLang="zh-TW" smtClean="0"/>
+              <a:t>Click to edit Master title style</a:t>
+            </a:r>
+            <a:endParaRPr lang="zh-TW" altLang="en-US"/>
+          </a:p>
+        </p:txBody>
+      </p:sp>
+      <p:sp>
+        <p:nvSpPr>
+          <p:cNvPr id="3" name="文字版面配置區 2"/>
+          <p:cNvSpPr>
+            <a:spLocks noGrp="1"/>
+          </p:cNvSpPr>
+          <p:nvPr>
+            <p:ph type="body" idx="1"/>
           </p:nvPr>
         </p:nvSpPr>
         <p:spPr>
           <a:xfrm>
-            <a:off x="457200" y="1535113"/>
-            <a:ext cx="4040188" cy="639762"/>
+            <a:off x="457200" y="1151335"/>
+            <a:ext cx="4040188" cy="479822"/>
           </a:xfrm>
         </p:spPr>
         <p:txBody>
-          <a:bodyPr anchor="ctr"/>
+          <a:bodyPr anchor="b"/>
           <a:lstStyle>
             <a:lvl1pPr marL="0" indent="0">
               <a:buNone/>
@@ -1483,15 +1477,15 @@
           <a:p>
             <a:pPr lvl="0"/>
             <a:r>
-              <a:rPr lang="en-US" smtClean="0"/>
-              <a:t>CLICK TO EDIT MASTER TEXT STYLES</a:t>
-            </a:r>
-          </a:p>
-        </p:txBody>
-      </p:sp>
-      <p:sp>
-        <p:nvSpPr>
-          <p:cNvPr id="4" name="Content Placeholder 3"/>
+              <a:rPr lang="en-US" altLang="zh-TW" smtClean="0"/>
+              <a:t>Click to edit Master text styles</a:t>
+            </a:r>
+          </a:p>
+        </p:txBody>
+      </p:sp>
+      <p:sp>
+        <p:nvSpPr>
+          <p:cNvPr id="4" name="內容版面配置區 3"/>
           <p:cNvSpPr>
             <a:spLocks noGrp="1"/>
           </p:cNvSpPr>
@@ -1501,8 +1495,8 @@
         </p:nvSpPr>
         <p:spPr>
           <a:xfrm>
-            <a:off x="457200" y="2174875"/>
-            <a:ext cx="4040188" cy="3951288"/>
+            <a:off x="457200" y="1631156"/>
+            <a:ext cx="4040188" cy="2963466"/>
           </a:xfrm>
         </p:spPr>
         <p:txBody>
@@ -1539,59 +1533,59 @@
           <a:p>
             <a:pPr lvl="0"/>
             <a:r>
-              <a:rPr lang="zh-TW" altLang="en-US" smtClean="0"/>
-              <a:t>按一下以編輯母片文字樣式</a:t>
+              <a:rPr lang="en-US" altLang="zh-TW" smtClean="0"/>
+              <a:t>Click to edit Master text styles</a:t>
             </a:r>
           </a:p>
           <a:p>
             <a:pPr lvl="1"/>
             <a:r>
-              <a:rPr lang="zh-TW" altLang="en-US" smtClean="0"/>
-              <a:t>第二層</a:t>
+              <a:rPr lang="en-US" altLang="zh-TW" smtClean="0"/>
+              <a:t>Second level</a:t>
             </a:r>
           </a:p>
           <a:p>
             <a:pPr lvl="2"/>
             <a:r>
-              <a:rPr lang="zh-TW" altLang="en-US" smtClean="0"/>
-              <a:t>第三層</a:t>
+              <a:rPr lang="en-US" altLang="zh-TW" smtClean="0"/>
+              <a:t>Third level</a:t>
             </a:r>
           </a:p>
           <a:p>
             <a:pPr lvl="3"/>
             <a:r>
-              <a:rPr lang="zh-TW" altLang="en-US" smtClean="0"/>
-              <a:t>第四層</a:t>
+              <a:rPr lang="en-US" altLang="zh-TW" smtClean="0"/>
+              <a:t>Fourth level</a:t>
             </a:r>
           </a:p>
           <a:p>
             <a:pPr lvl="4"/>
             <a:r>
-              <a:rPr lang="zh-TW" altLang="en-US" smtClean="0"/>
-              <a:t>第五層</a:t>
-            </a:r>
-            <a:endParaRPr lang="en-US"/>
-          </a:p>
-        </p:txBody>
-      </p:sp>
-      <p:sp>
-        <p:nvSpPr>
-          <p:cNvPr id="5" name="Text Placeholder 4"/>
-          <p:cNvSpPr>
-            <a:spLocks noGrp="1"/>
-          </p:cNvSpPr>
-          <p:nvPr>
-            <p:ph type="body" sz="quarter" idx="3" hasCustomPrompt="1"/>
+              <a:rPr lang="en-US" altLang="zh-TW" smtClean="0"/>
+              <a:t>Fifth level</a:t>
+            </a:r>
+            <a:endParaRPr lang="zh-TW" altLang="en-US"/>
+          </a:p>
+        </p:txBody>
+      </p:sp>
+      <p:sp>
+        <p:nvSpPr>
+          <p:cNvPr id="5" name="文字版面配置區 4"/>
+          <p:cNvSpPr>
+            <a:spLocks noGrp="1"/>
+          </p:cNvSpPr>
+          <p:nvPr>
+            <p:ph type="body" sz="quarter" idx="3"/>
           </p:nvPr>
         </p:nvSpPr>
         <p:spPr>
           <a:xfrm>
-            <a:off x="4645025" y="1535113"/>
-            <a:ext cx="4041775" cy="639762"/>
+            <a:off x="4645026" y="1151335"/>
+            <a:ext cx="4041775" cy="479822"/>
           </a:xfrm>
         </p:spPr>
         <p:txBody>
-          <a:bodyPr anchor="ctr"/>
+          <a:bodyPr anchor="b"/>
           <a:lstStyle>
             <a:lvl1pPr marL="0" indent="0">
               <a:buNone/>
@@ -1633,15 +1627,15 @@
           <a:p>
             <a:pPr lvl="0"/>
             <a:r>
-              <a:rPr lang="en-US" smtClean="0"/>
-              <a:t>CLICK TO EDIT MASTER TEXT STYLES</a:t>
-            </a:r>
-          </a:p>
-        </p:txBody>
-      </p:sp>
-      <p:sp>
-        <p:nvSpPr>
-          <p:cNvPr id="6" name="Content Placeholder 5"/>
+              <a:rPr lang="en-US" altLang="zh-TW" smtClean="0"/>
+              <a:t>Click to edit Master text styles</a:t>
+            </a:r>
+          </a:p>
+        </p:txBody>
+      </p:sp>
+      <p:sp>
+        <p:nvSpPr>
+          <p:cNvPr id="6" name="內容版面配置區 5"/>
           <p:cNvSpPr>
             <a:spLocks noGrp="1"/>
           </p:cNvSpPr>
@@ -1651,8 +1645,8 @@
         </p:nvSpPr>
         <p:spPr>
           <a:xfrm>
-            <a:off x="4645025" y="2174875"/>
-            <a:ext cx="4041775" cy="3951288"/>
+            <a:off x="4645026" y="1631156"/>
+            <a:ext cx="4041775" cy="2963466"/>
           </a:xfrm>
         </p:spPr>
         <p:txBody>
@@ -1689,44 +1683,44 @@
           <a:p>
             <a:pPr lvl="0"/>
             <a:r>
-              <a:rPr lang="zh-TW" altLang="en-US" smtClean="0"/>
-              <a:t>按一下以編輯母片文字樣式</a:t>
+              <a:rPr lang="en-US" altLang="zh-TW" smtClean="0"/>
+              <a:t>Click to edit Master text styles</a:t>
             </a:r>
           </a:p>
           <a:p>
             <a:pPr lvl="1"/>
             <a:r>
-              <a:rPr lang="zh-TW" altLang="en-US" smtClean="0"/>
-              <a:t>第二層</a:t>
+              <a:rPr lang="en-US" altLang="zh-TW" smtClean="0"/>
+              <a:t>Second level</a:t>
             </a:r>
           </a:p>
           <a:p>
             <a:pPr lvl="2"/>
             <a:r>
-              <a:rPr lang="zh-TW" altLang="en-US" smtClean="0"/>
-              <a:t>第三層</a:t>
+              <a:rPr lang="en-US" altLang="zh-TW" smtClean="0"/>
+              <a:t>Third level</a:t>
             </a:r>
           </a:p>
           <a:p>
             <a:pPr lvl="3"/>
             <a:r>
-              <a:rPr lang="zh-TW" altLang="en-US" smtClean="0"/>
-              <a:t>第四層</a:t>
+              <a:rPr lang="en-US" altLang="zh-TW" smtClean="0"/>
+              <a:t>Fourth level</a:t>
             </a:r>
           </a:p>
           <a:p>
             <a:pPr lvl="4"/>
             <a:r>
-              <a:rPr lang="zh-TW" altLang="en-US" smtClean="0"/>
-              <a:t>第五層</a:t>
-            </a:r>
-            <a:endParaRPr lang="en-US"/>
-          </a:p>
-        </p:txBody>
-      </p:sp>
-      <p:sp>
-        <p:nvSpPr>
-          <p:cNvPr id="7" name="Date Placeholder 6"/>
+              <a:rPr lang="en-US" altLang="zh-TW" smtClean="0"/>
+              <a:t>Fifth level</a:t>
+            </a:r>
+            <a:endParaRPr lang="zh-TW" altLang="en-US"/>
+          </a:p>
+        </p:txBody>
+      </p:sp>
+      <p:sp>
+        <p:nvSpPr>
+          <p:cNvPr id="7" name="日期版面配置區 6"/>
           <p:cNvSpPr>
             <a:spLocks noGrp="1"/>
           </p:cNvSpPr>
@@ -1741,7 +1735,7 @@
           <a:p>
             <a:fld id="{1B95BEA9-D391-447B-A819-7D2A28D2C1E7}" type="datetimeFigureOut">
               <a:rPr lang="zh-TW" altLang="en-US" smtClean="0"/>
-              <a:t>2013/5/18</a:t>
+              <a:t>2019/9/7</a:t>
             </a:fld>
             <a:endParaRPr lang="zh-TW" altLang="en-US"/>
           </a:p>
@@ -1749,7 +1743,7 @@
       </p:sp>
       <p:sp>
         <p:nvSpPr>
-          <p:cNvPr id="8" name="Footer Placeholder 7"/>
+          <p:cNvPr id="8" name="頁尾版面配置區 7"/>
           <p:cNvSpPr>
             <a:spLocks noGrp="1"/>
           </p:cNvSpPr>
@@ -1768,7 +1762,7 @@
       </p:sp>
       <p:sp>
         <p:nvSpPr>
-          <p:cNvPr id="9" name="Slide Number Placeholder 8"/>
+          <p:cNvPr id="9" name="投影片編號版面配置區 8"/>
           <p:cNvSpPr>
             <a:spLocks noGrp="1"/>
           </p:cNvSpPr>
@@ -1816,7 +1810,7 @@
       </p:grpSpPr>
       <p:sp>
         <p:nvSpPr>
-          <p:cNvPr id="2" name="Title 1"/>
+          <p:cNvPr id="2" name="標題 1"/>
           <p:cNvSpPr>
             <a:spLocks noGrp="1"/>
           </p:cNvSpPr>
@@ -1830,16 +1824,16 @@
           <a:lstStyle/>
           <a:p>
             <a:r>
-              <a:rPr lang="zh-TW" altLang="en-US" smtClean="0"/>
-              <a:t>按一下以編輯母片標題樣式</a:t>
-            </a:r>
-            <a:endParaRPr lang="en-US"/>
-          </a:p>
-        </p:txBody>
-      </p:sp>
-      <p:sp>
-        <p:nvSpPr>
-          <p:cNvPr id="3" name="Date Placeholder 2"/>
+              <a:rPr lang="en-US" altLang="zh-TW" smtClean="0"/>
+              <a:t>Click to edit Master title style</a:t>
+            </a:r>
+            <a:endParaRPr lang="zh-TW" altLang="en-US"/>
+          </a:p>
+        </p:txBody>
+      </p:sp>
+      <p:sp>
+        <p:nvSpPr>
+          <p:cNvPr id="3" name="日期版面配置區 2"/>
           <p:cNvSpPr>
             <a:spLocks noGrp="1"/>
           </p:cNvSpPr>
@@ -1854,7 +1848,7 @@
           <a:p>
             <a:fld id="{1B95BEA9-D391-447B-A819-7D2A28D2C1E7}" type="datetimeFigureOut">
               <a:rPr lang="zh-TW" altLang="en-US" smtClean="0"/>
-              <a:t>2013/5/18</a:t>
+              <a:t>2019/9/7</a:t>
             </a:fld>
             <a:endParaRPr lang="zh-TW" altLang="en-US"/>
           </a:p>
@@ -1862,7 +1856,7 @@
       </p:sp>
       <p:sp>
         <p:nvSpPr>
-          <p:cNvPr id="4" name="Footer Placeholder 3"/>
+          <p:cNvPr id="4" name="頁尾版面配置區 3"/>
           <p:cNvSpPr>
             <a:spLocks noGrp="1"/>
           </p:cNvSpPr>
@@ -1881,7 +1875,7 @@
       </p:sp>
       <p:sp>
         <p:nvSpPr>
-          <p:cNvPr id="5" name="Slide Number Placeholder 4"/>
+          <p:cNvPr id="5" name="投影片編號版面配置區 4"/>
           <p:cNvSpPr>
             <a:spLocks noGrp="1"/>
           </p:cNvSpPr>
@@ -1929,7 +1923,7 @@
       </p:grpSpPr>
       <p:sp>
         <p:nvSpPr>
-          <p:cNvPr id="2" name="Date Placeholder 1"/>
+          <p:cNvPr id="2" name="日期版面配置區 1"/>
           <p:cNvSpPr>
             <a:spLocks noGrp="1"/>
           </p:cNvSpPr>
@@ -1944,7 +1938,7 @@
           <a:p>
             <a:fld id="{1B95BEA9-D391-447B-A819-7D2A28D2C1E7}" type="datetimeFigureOut">
               <a:rPr lang="zh-TW" altLang="en-US" smtClean="0"/>
-              <a:t>2013/5/18</a:t>
+              <a:t>2019/9/7</a:t>
             </a:fld>
             <a:endParaRPr lang="zh-TW" altLang="en-US"/>
           </a:p>
@@ -1952,7 +1946,7 @@
       </p:sp>
       <p:sp>
         <p:nvSpPr>
-          <p:cNvPr id="3" name="Footer Placeholder 2"/>
+          <p:cNvPr id="3" name="頁尾版面配置區 2"/>
           <p:cNvSpPr>
             <a:spLocks noGrp="1"/>
           </p:cNvSpPr>
@@ -1971,7 +1965,7 @@
       </p:sp>
       <p:sp>
         <p:nvSpPr>
-          <p:cNvPr id="4" name="Slide Number Placeholder 3"/>
+          <p:cNvPr id="4" name="投影片編號版面配置區 3"/>
           <p:cNvSpPr>
             <a:spLocks noGrp="1"/>
           </p:cNvSpPr>
@@ -2019,57 +2013,39 @@
       </p:grpSpPr>
       <p:sp>
         <p:nvSpPr>
-          <p:cNvPr id="2" name="Title 1"/>
-          <p:cNvSpPr>
-            <a:spLocks noGrp="1"/>
-          </p:cNvSpPr>
-          <p:nvPr>
-            <p:ph type="title" hasCustomPrompt="1"/>
+          <p:cNvPr id="2" name="標題 1"/>
+          <p:cNvSpPr>
+            <a:spLocks noGrp="1"/>
+          </p:cNvSpPr>
+          <p:nvPr>
+            <p:ph type="title"/>
           </p:nvPr>
         </p:nvSpPr>
         <p:spPr>
           <a:xfrm>
-            <a:off x="457200" y="273050"/>
-            <a:ext cx="3008313" cy="1162050"/>
+            <a:off x="457201" y="204787"/>
+            <a:ext cx="3008313" cy="871538"/>
           </a:xfrm>
         </p:spPr>
         <p:txBody>
-          <a:bodyPr anchor="b">
-            <a:scene3d>
-              <a:camera prst="orthographicFront"/>
-              <a:lightRig rig="soft" dir="t"/>
-            </a:scene3d>
-            <a:sp3d prstMaterial="powder">
-              <a:contourClr>
-                <a:schemeClr val="bg2"/>
-              </a:contourClr>
-            </a:sp3d>
-          </a:bodyPr>
+          <a:bodyPr anchor="b"/>
           <a:lstStyle>
             <a:lvl1pPr algn="l">
-              <a:defRPr sz="2000" b="1" cap="none" spc="0">
-                <a:ln>
-                  <a:noFill/>
-                </a:ln>
-                <a:solidFill>
-                  <a:schemeClr val="tx2"/>
-                </a:solidFill>
-                <a:effectLst/>
-              </a:defRPr>
+              <a:defRPr sz="2000" b="1"/>
             </a:lvl1pPr>
           </a:lstStyle>
           <a:p>
             <a:r>
-              <a:rPr lang="en-US" smtClean="0"/>
-              <a:t>CLICK TO EDIT MASTER TITLE STYLE</a:t>
-            </a:r>
-            <a:endParaRPr lang="en-US"/>
-          </a:p>
-        </p:txBody>
-      </p:sp>
-      <p:sp>
-        <p:nvSpPr>
-          <p:cNvPr id="3" name="Content Placeholder 2"/>
+              <a:rPr lang="en-US" altLang="zh-TW" smtClean="0"/>
+              <a:t>Click to edit Master title style</a:t>
+            </a:r>
+            <a:endParaRPr lang="zh-TW" altLang="en-US"/>
+          </a:p>
+        </p:txBody>
+      </p:sp>
+      <p:sp>
+        <p:nvSpPr>
+          <p:cNvPr id="3" name="內容版面配置區 2"/>
           <p:cNvSpPr>
             <a:spLocks noGrp="1"/>
           </p:cNvSpPr>
@@ -2079,8 +2055,8 @@
         </p:nvSpPr>
         <p:spPr>
           <a:xfrm>
-            <a:off x="3575050" y="273050"/>
-            <a:ext cx="5111750" cy="5853113"/>
+            <a:off x="3575050" y="204788"/>
+            <a:ext cx="5111750" cy="4389835"/>
           </a:xfrm>
         </p:spPr>
         <p:txBody>
@@ -2117,44 +2093,44 @@
           <a:p>
             <a:pPr lvl="0"/>
             <a:r>
-              <a:rPr lang="zh-TW" altLang="en-US" smtClean="0"/>
-              <a:t>按一下以編輯母片文字樣式</a:t>
+              <a:rPr lang="en-US" altLang="zh-TW" smtClean="0"/>
+              <a:t>Click to edit Master text styles</a:t>
             </a:r>
           </a:p>
           <a:p>
             <a:pPr lvl="1"/>
             <a:r>
-              <a:rPr lang="zh-TW" altLang="en-US" smtClean="0"/>
-              <a:t>第二層</a:t>
+              <a:rPr lang="en-US" altLang="zh-TW" smtClean="0"/>
+              <a:t>Second level</a:t>
             </a:r>
           </a:p>
           <a:p>
             <a:pPr lvl="2"/>
             <a:r>
-              <a:rPr lang="zh-TW" altLang="en-US" smtClean="0"/>
-              <a:t>第三層</a:t>
+              <a:rPr lang="en-US" altLang="zh-TW" smtClean="0"/>
+              <a:t>Third level</a:t>
             </a:r>
           </a:p>
           <a:p>
             <a:pPr lvl="3"/>
             <a:r>
-              <a:rPr lang="zh-TW" altLang="en-US" smtClean="0"/>
-              <a:t>第四層</a:t>
+              <a:rPr lang="en-US" altLang="zh-TW" smtClean="0"/>
+              <a:t>Fourth level</a:t>
             </a:r>
           </a:p>
           <a:p>
             <a:pPr lvl="4"/>
             <a:r>
-              <a:rPr lang="zh-TW" altLang="en-US" smtClean="0"/>
-              <a:t>第五層</a:t>
-            </a:r>
-            <a:endParaRPr lang="en-US"/>
-          </a:p>
-        </p:txBody>
-      </p:sp>
-      <p:sp>
-        <p:nvSpPr>
-          <p:cNvPr id="4" name="Text Placeholder 3"/>
+              <a:rPr lang="en-US" altLang="zh-TW" smtClean="0"/>
+              <a:t>Fifth level</a:t>
+            </a:r>
+            <a:endParaRPr lang="zh-TW" altLang="en-US"/>
+          </a:p>
+        </p:txBody>
+      </p:sp>
+      <p:sp>
+        <p:nvSpPr>
+          <p:cNvPr id="4" name="文字版面配置區 3"/>
           <p:cNvSpPr>
             <a:spLocks noGrp="1"/>
           </p:cNvSpPr>
@@ -2164,8 +2140,8 @@
         </p:nvSpPr>
         <p:spPr>
           <a:xfrm>
-            <a:off x="457200" y="1435100"/>
-            <a:ext cx="3008313" cy="4691063"/>
+            <a:off x="457201" y="1076326"/>
+            <a:ext cx="3008313" cy="3518297"/>
           </a:xfrm>
         </p:spPr>
         <p:txBody>
@@ -2211,15 +2187,15 @@
           <a:p>
             <a:pPr lvl="0"/>
             <a:r>
-              <a:rPr lang="zh-TW" altLang="en-US" smtClean="0"/>
-              <a:t>按一下以編輯母片文字樣式</a:t>
-            </a:r>
-          </a:p>
-        </p:txBody>
-      </p:sp>
-      <p:sp>
-        <p:nvSpPr>
-          <p:cNvPr id="5" name="Date Placeholder 4"/>
+              <a:rPr lang="en-US" altLang="zh-TW" smtClean="0"/>
+              <a:t>Click to edit Master text styles</a:t>
+            </a:r>
+          </a:p>
+        </p:txBody>
+      </p:sp>
+      <p:sp>
+        <p:nvSpPr>
+          <p:cNvPr id="5" name="日期版面配置區 4"/>
           <p:cNvSpPr>
             <a:spLocks noGrp="1"/>
           </p:cNvSpPr>
@@ -2234,7 +2210,7 @@
           <a:p>
             <a:fld id="{1B95BEA9-D391-447B-A819-7D2A28D2C1E7}" type="datetimeFigureOut">
               <a:rPr lang="zh-TW" altLang="en-US" smtClean="0"/>
-              <a:t>2013/5/18</a:t>
+              <a:t>2019/9/7</a:t>
             </a:fld>
             <a:endParaRPr lang="zh-TW" altLang="en-US"/>
           </a:p>
@@ -2242,7 +2218,7 @@
       </p:sp>
       <p:sp>
         <p:nvSpPr>
-          <p:cNvPr id="6" name="Footer Placeholder 5"/>
+          <p:cNvPr id="6" name="頁尾版面配置區 5"/>
           <p:cNvSpPr>
             <a:spLocks noGrp="1"/>
           </p:cNvSpPr>
@@ -2261,7 +2237,7 @@
       </p:sp>
       <p:sp>
         <p:nvSpPr>
-          <p:cNvPr id="7" name="Slide Number Placeholder 6"/>
+          <p:cNvPr id="7" name="投影片編號版面配置區 6"/>
           <p:cNvSpPr>
             <a:spLocks noGrp="1"/>
           </p:cNvSpPr>
@@ -2309,68 +2285,115 @@
       </p:grpSpPr>
       <p:sp>
         <p:nvSpPr>
-          <p:cNvPr id="2" name="Title 1"/>
-          <p:cNvSpPr>
-            <a:spLocks noGrp="1"/>
-          </p:cNvSpPr>
-          <p:nvPr>
-            <p:ph type="title" hasCustomPrompt="1"/>
+          <p:cNvPr id="2" name="標題 1"/>
+          <p:cNvSpPr>
+            <a:spLocks noGrp="1"/>
+          </p:cNvSpPr>
+          <p:nvPr>
+            <p:ph type="title"/>
           </p:nvPr>
         </p:nvSpPr>
         <p:spPr>
           <a:xfrm>
-            <a:off x="381000" y="1447800"/>
-            <a:ext cx="2971800" cy="1328738"/>
+            <a:off x="1792288" y="3600450"/>
+            <a:ext cx="5486400" cy="425054"/>
           </a:xfrm>
         </p:spPr>
         <p:txBody>
-          <a:bodyPr anchor="b">
-            <a:scene3d>
-              <a:camera prst="orthographicFront"/>
-              <a:lightRig rig="soft" dir="t"/>
-            </a:scene3d>
-            <a:sp3d prstMaterial="powder">
-              <a:contourClr>
-                <a:schemeClr val="bg2"/>
-              </a:contourClr>
-            </a:sp3d>
-          </a:bodyPr>
+          <a:bodyPr anchor="b"/>
           <a:lstStyle>
             <a:lvl1pPr algn="l">
-              <a:defRPr sz="2000" b="1" cap="none" spc="0">
-                <a:ln>
-                  <a:noFill/>
-                </a:ln>
-                <a:solidFill>
-                  <a:schemeClr val="tx2"/>
-                </a:solidFill>
-                <a:effectLst/>
-              </a:defRPr>
+              <a:defRPr sz="2000" b="1"/>
             </a:lvl1pPr>
           </a:lstStyle>
           <a:p>
             <a:r>
-              <a:rPr lang="en-US" smtClean="0"/>
-              <a:t>CLICK TO EDIT MASTER TITLE STYLE</a:t>
-            </a:r>
-            <a:endParaRPr lang="en-US"/>
-          </a:p>
-        </p:txBody>
-      </p:sp>
-      <p:sp>
-        <p:nvSpPr>
-          <p:cNvPr id="4" name="Text Placeholder 3"/>
-          <p:cNvSpPr>
-            <a:spLocks noGrp="1"/>
-          </p:cNvSpPr>
-          <p:nvPr>
-            <p:ph type="body" sz="half" idx="2"/>
+              <a:rPr lang="en-US" altLang="zh-TW" smtClean="0"/>
+              <a:t>Click to edit Master title style</a:t>
+            </a:r>
+            <a:endParaRPr lang="zh-TW" altLang="en-US"/>
+          </a:p>
+        </p:txBody>
+      </p:sp>
+      <p:sp>
+        <p:nvSpPr>
+          <p:cNvPr id="3" name="圖片版面配置區 2"/>
+          <p:cNvSpPr>
+            <a:spLocks noGrp="1"/>
+          </p:cNvSpPr>
+          <p:nvPr>
+            <p:ph type="pic" idx="1"/>
           </p:nvPr>
         </p:nvSpPr>
         <p:spPr>
           <a:xfrm>
-            <a:off x="381000" y="2776538"/>
-            <a:ext cx="2971800" cy="804862"/>
+            <a:off x="1792288" y="459581"/>
+            <a:ext cx="5486400" cy="3086100"/>
+          </a:xfrm>
+        </p:spPr>
+        <p:txBody>
+          <a:bodyPr/>
+          <a:lstStyle>
+            <a:lvl1pPr marL="0" indent="0">
+              <a:buNone/>
+              <a:defRPr sz="3200"/>
+            </a:lvl1pPr>
+            <a:lvl2pPr marL="457200" indent="0">
+              <a:buNone/>
+              <a:defRPr sz="2800"/>
+            </a:lvl2pPr>
+            <a:lvl3pPr marL="914400" indent="0">
+              <a:buNone/>
+              <a:defRPr sz="2400"/>
+            </a:lvl3pPr>
+            <a:lvl4pPr marL="1371600" indent="0">
+              <a:buNone/>
+              <a:defRPr sz="2000"/>
+            </a:lvl4pPr>
+            <a:lvl5pPr marL="1828800" indent="0">
+              <a:buNone/>
+              <a:defRPr sz="2000"/>
+            </a:lvl5pPr>
+            <a:lvl6pPr marL="2286000" indent="0">
+              <a:buNone/>
+              <a:defRPr sz="2000"/>
+            </a:lvl6pPr>
+            <a:lvl7pPr marL="2743200" indent="0">
+              <a:buNone/>
+              <a:defRPr sz="2000"/>
+            </a:lvl7pPr>
+            <a:lvl8pPr marL="3200400" indent="0">
+              <a:buNone/>
+              <a:defRPr sz="2000"/>
+            </a:lvl8pPr>
+            <a:lvl9pPr marL="3657600" indent="0">
+              <a:buNone/>
+              <a:defRPr sz="2000"/>
+            </a:lvl9pPr>
+          </a:lstStyle>
+          <a:p>
+            <a:r>
+              <a:rPr lang="en-US" altLang="zh-TW" smtClean="0"/>
+              <a:t>Click icon to add picture</a:t>
+            </a:r>
+            <a:endParaRPr lang="zh-TW" altLang="en-US"/>
+          </a:p>
+        </p:txBody>
+      </p:sp>
+      <p:sp>
+        <p:nvSpPr>
+          <p:cNvPr id="4" name="文字版面配置區 3"/>
+          <p:cNvSpPr>
+            <a:spLocks noGrp="1"/>
+          </p:cNvSpPr>
+          <p:nvPr>
+            <p:ph type="body" sz="half" idx="2"/>
+          </p:nvPr>
+        </p:nvSpPr>
+        <p:spPr>
+          <a:xfrm>
+            <a:off x="1792288" y="4025503"/>
+            <a:ext cx="5486400" cy="603647"/>
           </a:xfrm>
         </p:spPr>
         <p:txBody>
@@ -2416,15 +2439,15 @@
           <a:p>
             <a:pPr lvl="0"/>
             <a:r>
-              <a:rPr lang="zh-TW" altLang="en-US" smtClean="0"/>
-              <a:t>按一下以編輯母片文字樣式</a:t>
-            </a:r>
-          </a:p>
-        </p:txBody>
-      </p:sp>
-      <p:sp>
-        <p:nvSpPr>
-          <p:cNvPr id="5" name="Date Placeholder 4"/>
+              <a:rPr lang="en-US" altLang="zh-TW" smtClean="0"/>
+              <a:t>Click to edit Master text styles</a:t>
+            </a:r>
+          </a:p>
+        </p:txBody>
+      </p:sp>
+      <p:sp>
+        <p:nvSpPr>
+          <p:cNvPr id="5" name="日期版面配置區 4"/>
           <p:cNvSpPr>
             <a:spLocks noGrp="1"/>
           </p:cNvSpPr>
@@ -2439,7 +2462,7 @@
           <a:p>
             <a:fld id="{1B95BEA9-D391-447B-A819-7D2A28D2C1E7}" type="datetimeFigureOut">
               <a:rPr lang="zh-TW" altLang="en-US" smtClean="0"/>
-              <a:t>2013/5/18</a:t>
+              <a:t>2019/9/7</a:t>
             </a:fld>
             <a:endParaRPr lang="zh-TW" altLang="en-US"/>
           </a:p>
@@ -2447,7 +2470,7 @@
       </p:sp>
       <p:sp>
         <p:nvSpPr>
-          <p:cNvPr id="6" name="Footer Placeholder 5"/>
+          <p:cNvPr id="6" name="頁尾版面配置區 5"/>
           <p:cNvSpPr>
             <a:spLocks noGrp="1"/>
           </p:cNvSpPr>
@@ -2466,7 +2489,7 @@
       </p:sp>
       <p:sp>
         <p:nvSpPr>
-          <p:cNvPr id="7" name="Slide Number Placeholder 6"/>
+          <p:cNvPr id="7" name="投影片編號版面配置區 6"/>
           <p:cNvSpPr>
             <a:spLocks noGrp="1"/>
           </p:cNvSpPr>
@@ -2484,310 +2507,6 @@
               <a:t>‹#›</a:t>
             </a:fld>
             <a:endParaRPr lang="zh-TW" altLang="en-US"/>
-          </a:p>
-        </p:txBody>
-      </p:sp>
-      <p:sp>
-        <p:nvSpPr>
-          <p:cNvPr id="9" name="Rectangle 8"/>
-          <p:cNvSpPr/>
-          <p:nvPr/>
-        </p:nvSpPr>
-        <p:spPr>
-          <a:xfrm rot="21172883" flipH="1">
-            <a:off x="4068648" y="1312793"/>
-            <a:ext cx="3673971" cy="3673971"/>
-          </a:xfrm>
-          <a:prstGeom prst="rect">
-            <a:avLst/>
-          </a:prstGeom>
-          <a:solidFill>
-            <a:srgbClr val="FFFFFF"/>
-          </a:solidFill>
-          <a:ln w="3175">
-            <a:solidFill>
-              <a:srgbClr val="777777"/>
-            </a:solidFill>
-          </a:ln>
-          <a:effectLst>
-            <a:outerShdw blurRad="63500" dist="6350" dir="5400000" algn="t" rotWithShape="0">
-              <a:prstClr val="black">
-                <a:alpha val="50000"/>
-              </a:prstClr>
-            </a:outerShdw>
-          </a:effectLst>
-        </p:spPr>
-        <p:style>
-          <a:lnRef idx="2">
-            <a:schemeClr val="accent1">
-              <a:shade val="50000"/>
-            </a:schemeClr>
-          </a:lnRef>
-          <a:fillRef idx="1">
-            <a:schemeClr val="accent1"/>
-          </a:fillRef>
-          <a:effectRef idx="0">
-            <a:schemeClr val="accent1"/>
-          </a:effectRef>
-          <a:fontRef idx="minor">
-            <a:schemeClr val="lt1"/>
-          </a:fontRef>
-        </p:style>
-        <p:txBody>
-          <a:bodyPr rtlCol="0" anchor="ctr"/>
-          <a:lstStyle/>
-          <a:p>
-            <a:pPr algn="ctr"/>
-            <a:r>
-              <a:rPr lang="en-US" dirty="0" smtClean="0"/>
-              <a:t>4</a:t>
-            </a:r>
-            <a:endParaRPr lang="en-US" dirty="0"/>
-          </a:p>
-        </p:txBody>
-      </p:sp>
-      <p:sp>
-        <p:nvSpPr>
-          <p:cNvPr id="10" name="Rectangle 9"/>
-          <p:cNvSpPr/>
-          <p:nvPr/>
-        </p:nvSpPr>
-        <p:spPr>
-          <a:xfrm rot="21435926" flipH="1">
-            <a:off x="4045012" y="1267664"/>
-            <a:ext cx="3673971" cy="3673971"/>
-          </a:xfrm>
-          <a:prstGeom prst="rect">
-            <a:avLst/>
-          </a:prstGeom>
-          <a:solidFill>
-            <a:srgbClr val="FFFFFF"/>
-          </a:solidFill>
-          <a:ln w="3175">
-            <a:solidFill>
-              <a:srgbClr val="777777"/>
-            </a:solidFill>
-          </a:ln>
-          <a:effectLst>
-            <a:outerShdw blurRad="63500" dist="6350" dir="5400000" algn="t" rotWithShape="0">
-              <a:prstClr val="black">
-                <a:alpha val="50000"/>
-              </a:prstClr>
-            </a:outerShdw>
-          </a:effectLst>
-        </p:spPr>
-        <p:style>
-          <a:lnRef idx="2">
-            <a:schemeClr val="accent1">
-              <a:shade val="50000"/>
-            </a:schemeClr>
-          </a:lnRef>
-          <a:fillRef idx="1">
-            <a:schemeClr val="accent1"/>
-          </a:fillRef>
-          <a:effectRef idx="0">
-            <a:schemeClr val="accent1"/>
-          </a:effectRef>
-          <a:fontRef idx="minor">
-            <a:schemeClr val="lt1"/>
-          </a:fontRef>
-        </p:style>
-        <p:txBody>
-          <a:bodyPr rtlCol="0" anchor="ctr"/>
-          <a:lstStyle/>
-          <a:p>
-            <a:pPr algn="ctr"/>
-            <a:r>
-              <a:rPr lang="en-US" dirty="0" smtClean="0"/>
-              <a:t>4</a:t>
-            </a:r>
-            <a:endParaRPr lang="en-US" dirty="0"/>
-          </a:p>
-        </p:txBody>
-      </p:sp>
-      <p:sp>
-        <p:nvSpPr>
-          <p:cNvPr id="11" name="Rectangle 10"/>
-          <p:cNvSpPr/>
-          <p:nvPr/>
-        </p:nvSpPr>
-        <p:spPr>
-          <a:xfrm>
-            <a:off x="4065563" y="1252028"/>
-            <a:ext cx="3840480" cy="3840480"/>
-          </a:xfrm>
-          <a:prstGeom prst="rect">
-            <a:avLst/>
-          </a:prstGeom>
-          <a:solidFill>
-            <a:srgbClr val="FFFFFF"/>
-          </a:solidFill>
-          <a:ln w="3175">
-            <a:solidFill>
-              <a:srgbClr val="777777"/>
-            </a:solidFill>
-          </a:ln>
-          <a:effectLst>
-            <a:outerShdw blurRad="76200" dist="6350" dir="5400000" algn="t" rotWithShape="0">
-              <a:prstClr val="black">
-                <a:alpha val="60000"/>
-              </a:prstClr>
-            </a:outerShdw>
-          </a:effectLst>
-        </p:spPr>
-        <p:style>
-          <a:lnRef idx="2">
-            <a:schemeClr val="accent1">
-              <a:shade val="50000"/>
-            </a:schemeClr>
-          </a:lnRef>
-          <a:fillRef idx="1">
-            <a:schemeClr val="accent1"/>
-          </a:fillRef>
-          <a:effectRef idx="0">
-            <a:schemeClr val="accent1"/>
-          </a:effectRef>
-          <a:fontRef idx="minor">
-            <a:schemeClr val="lt1"/>
-          </a:fontRef>
-        </p:style>
-        <p:txBody>
-          <a:bodyPr rtlCol="0" anchor="ctr"/>
-          <a:lstStyle/>
-          <a:p>
-            <a:pPr algn="ctr"/>
-            <a:r>
-              <a:rPr lang="en-US" dirty="0" smtClean="0"/>
-              <a:t>4</a:t>
-            </a:r>
-            <a:endParaRPr lang="en-US" dirty="0"/>
-          </a:p>
-        </p:txBody>
-      </p:sp>
-      <p:sp>
-        <p:nvSpPr>
-          <p:cNvPr id="12" name="Rectangle 11"/>
-          <p:cNvSpPr/>
-          <p:nvPr/>
-        </p:nvSpPr>
-        <p:spPr>
-          <a:xfrm rot="293056">
-            <a:off x="4124179" y="1181685"/>
-            <a:ext cx="3977640" cy="3977640"/>
-          </a:xfrm>
-          <a:prstGeom prst="rect">
-            <a:avLst/>
-          </a:prstGeom>
-          <a:solidFill>
-            <a:srgbClr val="FFFFFF"/>
-          </a:solidFill>
-          <a:ln w="3175">
-            <a:solidFill>
-              <a:srgbClr val="777777"/>
-            </a:solidFill>
-          </a:ln>
-          <a:effectLst>
-            <a:outerShdw blurRad="50000" dist="50800" dir="12900000" sy="99500" kx="90000" ky="150000" algn="tl" rotWithShape="0">
-              <a:srgbClr val="000000">
-                <a:alpha val="37000"/>
-              </a:srgbClr>
-            </a:outerShdw>
-          </a:effectLst>
-        </p:spPr>
-        <p:style>
-          <a:lnRef idx="2">
-            <a:schemeClr val="accent1">
-              <a:shade val="50000"/>
-            </a:schemeClr>
-          </a:lnRef>
-          <a:fillRef idx="1">
-            <a:schemeClr val="accent1"/>
-          </a:fillRef>
-          <a:effectRef idx="0">
-            <a:schemeClr val="accent1"/>
-          </a:effectRef>
-          <a:fontRef idx="minor">
-            <a:schemeClr val="lt1"/>
-          </a:fontRef>
-        </p:style>
-        <p:txBody>
-          <a:bodyPr rtlCol="0" anchor="ctr"/>
-          <a:lstStyle/>
-          <a:p>
-            <a:pPr algn="ctr"/>
-            <a:r>
-              <a:rPr lang="en-US" dirty="0" smtClean="0"/>
-              <a:t>4</a:t>
-            </a:r>
-            <a:endParaRPr lang="en-US" dirty="0"/>
-          </a:p>
-        </p:txBody>
-      </p:sp>
-      <p:sp>
-        <p:nvSpPr>
-          <p:cNvPr id="3" name="Picture Placeholder 2"/>
-          <p:cNvSpPr>
-            <a:spLocks noGrp="1"/>
-          </p:cNvSpPr>
-          <p:nvPr>
-            <p:ph type="pic" idx="1"/>
-          </p:nvPr>
-        </p:nvSpPr>
-        <p:spPr>
-          <a:xfrm rot="300000">
-            <a:off x="4275668" y="1323975"/>
-            <a:ext cx="3657600" cy="3657600"/>
-          </a:xfrm>
-          <a:solidFill>
-            <a:schemeClr val="bg2"/>
-          </a:solidFill>
-        </p:spPr>
-        <p:txBody>
-          <a:bodyPr/>
-          <a:lstStyle>
-            <a:lvl1pPr marL="0" indent="0">
-              <a:buNone/>
-              <a:defRPr sz="3200"/>
-            </a:lvl1pPr>
-            <a:lvl2pPr marL="457200" indent="0">
-              <a:buNone/>
-              <a:defRPr sz="2800"/>
-            </a:lvl2pPr>
-            <a:lvl3pPr marL="914400" indent="0">
-              <a:buNone/>
-              <a:defRPr sz="2400"/>
-            </a:lvl3pPr>
-            <a:lvl4pPr marL="1371600" indent="0">
-              <a:buNone/>
-              <a:defRPr sz="2000"/>
-            </a:lvl4pPr>
-            <a:lvl5pPr marL="1828800" indent="0">
-              <a:buNone/>
-              <a:defRPr sz="2000"/>
-            </a:lvl5pPr>
-            <a:lvl6pPr marL="2286000" indent="0">
-              <a:buNone/>
-              <a:defRPr sz="2000"/>
-            </a:lvl6pPr>
-            <a:lvl7pPr marL="2743200" indent="0">
-              <a:buNone/>
-              <a:defRPr sz="2000"/>
-            </a:lvl7pPr>
-            <a:lvl8pPr marL="3200400" indent="0">
-              <a:buNone/>
-              <a:defRPr sz="2000"/>
-            </a:lvl8pPr>
-            <a:lvl9pPr marL="3657600" indent="0">
-              <a:buNone/>
-              <a:defRPr sz="2000"/>
-            </a:lvl9pPr>
-          </a:lstStyle>
-          <a:p>
-            <a:r>
-              <a:rPr lang="zh-TW" altLang="en-US" smtClean="0"/>
-              <a:t>按一下圖示以新增圖片</a:t>
-            </a:r>
-            <a:endParaRPr lang="en-US"/>
           </a:p>
         </p:txBody>
       </p:sp>
@@ -2803,9 +2522,14 @@
 <p:sldMaster xmlns:a="http://schemas.openxmlformats.org/drawingml/2006/main" xmlns:r="http://schemas.openxmlformats.org/officeDocument/2006/relationships" xmlns:p="http://schemas.openxmlformats.org/presentationml/2006/main">
   <p:cSld>
     <p:bg>
-      <p:bgRef idx="1003">
-        <a:schemeClr val="bg2"/>
-      </p:bgRef>
+      <p:bgPr>
+        <a:blipFill dpi="0" rotWithShape="1">
+          <a:blip r:embed="rId13"/>
+          <a:srcRect/>
+          <a:tile tx="0" ty="0" sx="100000" sy="100000" flip="none" algn="tl"/>
+        </a:blipFill>
+        <a:effectLst/>
+      </p:bgPr>
     </p:bg>
     <p:spTree>
       <p:nvGrpSpPr>
@@ -2823,7 +2547,7 @@
       </p:grpSpPr>
       <p:sp>
         <p:nvSpPr>
-          <p:cNvPr id="2" name="Title Placeholder 1"/>
+          <p:cNvPr id="2" name="標題版面配置區 1"/>
           <p:cNvSpPr>
             <a:spLocks noGrp="1"/>
           </p:cNvSpPr>
@@ -2833,8 +2557,8 @@
         </p:nvSpPr>
         <p:spPr>
           <a:xfrm>
-            <a:off x="457200" y="274638"/>
-            <a:ext cx="8229600" cy="1143000"/>
+            <a:off x="457200" y="205979"/>
+            <a:ext cx="8229600" cy="857250"/>
           </a:xfrm>
           <a:prstGeom prst="rect">
             <a:avLst/>
@@ -2843,16 +2567,6 @@
         <p:txBody>
           <a:bodyPr vert="horz" lIns="91440" tIns="45720" rIns="91440" bIns="45720" rtlCol="0" anchor="ctr">
             <a:normAutofit/>
-            <a:scene3d>
-              <a:camera prst="orthographicFront"/>
-              <a:lightRig rig="soft" dir="t"/>
-            </a:scene3d>
-            <a:sp3d contourW="12700" prstMaterial="powder">
-              <a:bevelT w="29210" h="12700"/>
-              <a:contourClr>
-                <a:schemeClr val="bg2"/>
-              </a:contourClr>
-            </a:sp3d>
           </a:bodyPr>
           <a:lstStyle/>
           <a:p>
@@ -2860,13 +2574,13 @@
               <a:rPr lang="zh-TW" altLang="en-US" smtClean="0"/>
               <a:t>按一下以編輯母片標題樣式</a:t>
             </a:r>
-            <a:endParaRPr lang="en-US"/>
-          </a:p>
-        </p:txBody>
-      </p:sp>
-      <p:sp>
-        <p:nvSpPr>
-          <p:cNvPr id="3" name="Text Placeholder 2"/>
+            <a:endParaRPr lang="zh-TW" altLang="en-US"/>
+          </a:p>
+        </p:txBody>
+      </p:sp>
+      <p:sp>
+        <p:nvSpPr>
+          <p:cNvPr id="3" name="文字版面配置區 2"/>
           <p:cNvSpPr>
             <a:spLocks noGrp="1"/>
           </p:cNvSpPr>
@@ -2876,8 +2590,8 @@
         </p:nvSpPr>
         <p:spPr>
           <a:xfrm>
-            <a:off x="457200" y="1600200"/>
-            <a:ext cx="8229600" cy="4525963"/>
+            <a:off x="457200" y="1200151"/>
+            <a:ext cx="8229600" cy="3394472"/>
           </a:xfrm>
           <a:prstGeom prst="rect">
             <a:avLst/>
@@ -2922,13 +2636,13 @@
               <a:rPr lang="zh-TW" altLang="en-US" smtClean="0"/>
               <a:t>第五層</a:t>
             </a:r>
-            <a:endParaRPr lang="en-US"/>
-          </a:p>
-        </p:txBody>
-      </p:sp>
-      <p:sp>
-        <p:nvSpPr>
-          <p:cNvPr id="4" name="Date Placeholder 3"/>
+            <a:endParaRPr lang="zh-TW" altLang="en-US"/>
+          </a:p>
+        </p:txBody>
+      </p:sp>
+      <p:sp>
+        <p:nvSpPr>
+          <p:cNvPr id="4" name="日期版面配置區 3"/>
           <p:cNvSpPr>
             <a:spLocks noGrp="1"/>
           </p:cNvSpPr>
@@ -2938,8 +2652,8 @@
         </p:nvSpPr>
         <p:spPr>
           <a:xfrm>
-            <a:off x="457200" y="6356350"/>
-            <a:ext cx="2133600" cy="365125"/>
+            <a:off x="457200" y="4767263"/>
+            <a:ext cx="2133600" cy="273844"/>
           </a:xfrm>
           <a:prstGeom prst="rect">
             <a:avLst/>
@@ -2949,9 +2663,11 @@
           <a:bodyPr vert="horz" lIns="91440" tIns="45720" rIns="91440" bIns="45720" rtlCol="0" anchor="ctr"/>
           <a:lstStyle>
             <a:lvl1pPr algn="l">
-              <a:defRPr sz="1100">
+              <a:defRPr sz="1200">
                 <a:solidFill>
-                  <a:schemeClr val="tx1"/>
+                  <a:schemeClr val="tx1">
+                    <a:tint val="75000"/>
+                  </a:schemeClr>
                 </a:solidFill>
               </a:defRPr>
             </a:lvl1pPr>
@@ -2959,7 +2675,7 @@
           <a:p>
             <a:fld id="{1B95BEA9-D391-447B-A819-7D2A28D2C1E7}" type="datetimeFigureOut">
               <a:rPr lang="zh-TW" altLang="en-US" smtClean="0"/>
-              <a:t>2013/5/18</a:t>
+              <a:t>2019/9/7</a:t>
             </a:fld>
             <a:endParaRPr lang="zh-TW" altLang="en-US"/>
           </a:p>
@@ -2967,7 +2683,7 @@
       </p:sp>
       <p:sp>
         <p:nvSpPr>
-          <p:cNvPr id="5" name="Footer Placeholder 4"/>
+          <p:cNvPr id="5" name="頁尾版面配置區 4"/>
           <p:cNvSpPr>
             <a:spLocks noGrp="1"/>
           </p:cNvSpPr>
@@ -2977,8 +2693,8 @@
         </p:nvSpPr>
         <p:spPr>
           <a:xfrm>
-            <a:off x="3124200" y="6356350"/>
-            <a:ext cx="2895600" cy="365125"/>
+            <a:off x="3124200" y="4767263"/>
+            <a:ext cx="2895600" cy="273844"/>
           </a:xfrm>
           <a:prstGeom prst="rect">
             <a:avLst/>
@@ -2988,9 +2704,11 @@
           <a:bodyPr vert="horz" lIns="91440" tIns="45720" rIns="91440" bIns="45720" rtlCol="0" anchor="ctr"/>
           <a:lstStyle>
             <a:lvl1pPr algn="ctr">
-              <a:defRPr sz="1100">
+              <a:defRPr sz="1200">
                 <a:solidFill>
-                  <a:schemeClr val="tx1"/>
+                  <a:schemeClr val="tx1">
+                    <a:tint val="75000"/>
+                  </a:schemeClr>
                 </a:solidFill>
               </a:defRPr>
             </a:lvl1pPr>
@@ -3002,7 +2720,7 @@
       </p:sp>
       <p:sp>
         <p:nvSpPr>
-          <p:cNvPr id="6" name="Slide Number Placeholder 5"/>
+          <p:cNvPr id="6" name="投影片編號版面配置區 5"/>
           <p:cNvSpPr>
             <a:spLocks noGrp="1"/>
           </p:cNvSpPr>
@@ -3012,8 +2730,8 @@
         </p:nvSpPr>
         <p:spPr>
           <a:xfrm>
-            <a:off x="6553200" y="6356350"/>
-            <a:ext cx="2133600" cy="365125"/>
+            <a:off x="6553200" y="4767263"/>
+            <a:ext cx="2133600" cy="273844"/>
           </a:xfrm>
           <a:prstGeom prst="rect">
             <a:avLst/>
@@ -3023,9 +2741,11 @@
           <a:bodyPr vert="horz" lIns="91440" tIns="45720" rIns="91440" bIns="45720" rtlCol="0" anchor="ctr"/>
           <a:lstStyle>
             <a:lvl1pPr algn="r">
-              <a:defRPr sz="1100">
+              <a:defRPr sz="1200">
                 <a:solidFill>
-                  <a:schemeClr val="tx1"/>
+                  <a:schemeClr val="tx1">
+                    <a:tint val="75000"/>
+                  </a:schemeClr>
                 </a:solidFill>
               </a:defRPr>
             </a:lvl1pPr>
@@ -3043,112 +2763,43 @@
   </p:cSld>
   <p:clrMap bg1="lt1" tx1="dk1" bg2="lt2" tx2="dk2" accent1="accent1" accent2="accent2" accent3="accent3" accent4="accent4" accent5="accent5" accent6="accent6" hlink="hlink" folHlink="folHlink"/>
   <p:sldLayoutIdLst>
-    <p:sldLayoutId id="2147483661" r:id="rId1"/>
-    <p:sldLayoutId id="2147483662" r:id="rId2"/>
-    <p:sldLayoutId id="2147483663" r:id="rId3"/>
-    <p:sldLayoutId id="2147483664" r:id="rId4"/>
-    <p:sldLayoutId id="2147483665" r:id="rId5"/>
-    <p:sldLayoutId id="2147483666" r:id="rId6"/>
-    <p:sldLayoutId id="2147483667" r:id="rId7"/>
-    <p:sldLayoutId id="2147483668" r:id="rId8"/>
-    <p:sldLayoutId id="2147483669" r:id="rId9"/>
-    <p:sldLayoutId id="2147483670" r:id="rId10"/>
-    <p:sldLayoutId id="2147483671" r:id="rId11"/>
+    <p:sldLayoutId id="2147483673" r:id="rId1"/>
+    <p:sldLayoutId id="2147483674" r:id="rId2"/>
+    <p:sldLayoutId id="2147483675" r:id="rId3"/>
+    <p:sldLayoutId id="2147483676" r:id="rId4"/>
+    <p:sldLayoutId id="2147483677" r:id="rId5"/>
+    <p:sldLayoutId id="2147483678" r:id="rId6"/>
+    <p:sldLayoutId id="2147483679" r:id="rId7"/>
+    <p:sldLayoutId id="2147483680" r:id="rId8"/>
+    <p:sldLayoutId id="2147483681" r:id="rId9"/>
+    <p:sldLayoutId id="2147483682" r:id="rId10"/>
+    <p:sldLayoutId id="2147483683" r:id="rId11"/>
   </p:sldLayoutIdLst>
   <p:txStyles>
     <p:titleStyle>
-      <a:lvl1pPr algn="l" defTabSz="914400" rtl="0" eaLnBrk="1" latinLnBrk="0" hangingPunct="1">
+      <a:lvl1pPr algn="ctr" defTabSz="914400" rtl="0" eaLnBrk="1" latinLnBrk="0" hangingPunct="1">
         <a:spcBef>
           <a:spcPct val="0"/>
         </a:spcBef>
         <a:buNone/>
-        <a:defRPr sz="4400" b="1" kern="1200">
-          <a:ln>
-            <a:noFill/>
-          </a:ln>
+        <a:defRPr sz="4400" kern="1200">
           <a:solidFill>
-            <a:schemeClr val="tx2"/>
+            <a:schemeClr val="tx1"/>
           </a:solidFill>
-          <a:effectLst>
-            <a:outerShdw blurRad="50800" dist="25400" dir="5400000" algn="t" rotWithShape="0">
-              <a:prstClr val="black">
-                <a:alpha val="80000"/>
-              </a:prstClr>
-            </a:outerShdw>
-          </a:effectLst>
           <a:latin typeface="+mj-lt"/>
           <a:ea typeface="+mj-ea"/>
           <a:cs typeface="+mj-cs"/>
         </a:defRPr>
       </a:lvl1pPr>
-      <a:lvl2pPr eaLnBrk="1" hangingPunct="1">
-        <a:defRPr>
-          <a:solidFill>
-            <a:schemeClr val="tx2"/>
-          </a:solidFill>
-        </a:defRPr>
-      </a:lvl2pPr>
-      <a:lvl3pPr eaLnBrk="1" hangingPunct="1">
-        <a:defRPr>
-          <a:solidFill>
-            <a:schemeClr val="tx2"/>
-          </a:solidFill>
-        </a:defRPr>
-      </a:lvl3pPr>
-      <a:lvl4pPr eaLnBrk="1" hangingPunct="1">
-        <a:defRPr>
-          <a:solidFill>
-            <a:schemeClr val="tx2"/>
-          </a:solidFill>
-        </a:defRPr>
-      </a:lvl4pPr>
-      <a:lvl5pPr eaLnBrk="1" hangingPunct="1">
-        <a:defRPr>
-          <a:solidFill>
-            <a:schemeClr val="tx2"/>
-          </a:solidFill>
-        </a:defRPr>
-      </a:lvl5pPr>
-      <a:lvl6pPr eaLnBrk="1" hangingPunct="1">
-        <a:defRPr>
-          <a:solidFill>
-            <a:schemeClr val="tx2"/>
-          </a:solidFill>
-        </a:defRPr>
-      </a:lvl6pPr>
-      <a:lvl7pPr eaLnBrk="1" hangingPunct="1">
-        <a:defRPr>
-          <a:solidFill>
-            <a:schemeClr val="tx2"/>
-          </a:solidFill>
-        </a:defRPr>
-      </a:lvl7pPr>
-      <a:lvl8pPr eaLnBrk="1" hangingPunct="1">
-        <a:defRPr>
-          <a:solidFill>
-            <a:schemeClr val="tx2"/>
-          </a:solidFill>
-        </a:defRPr>
-      </a:lvl8pPr>
-      <a:lvl9pPr eaLnBrk="1" hangingPunct="1">
-        <a:defRPr>
-          <a:solidFill>
-            <a:schemeClr val="tx2"/>
-          </a:solidFill>
-        </a:defRPr>
-      </a:lvl9pPr>
     </p:titleStyle>
     <p:bodyStyle>
       <a:lvl1pPr marL="342900" indent="-342900" algn="l" defTabSz="914400" rtl="0" eaLnBrk="1" latinLnBrk="0" hangingPunct="1">
         <a:spcBef>
           <a:spcPct val="20000"/>
         </a:spcBef>
-        <a:buClr>
-          <a:schemeClr val="tx2"/>
-        </a:buClr>
-        <a:buFont typeface="Wingdings" pitchFamily="2" charset="2"/>
-        <a:buChar char="§"/>
-        <a:defRPr sz="2800" kern="1200">
+        <a:buFont typeface="Arial" pitchFamily="34" charset="0"/>
+        <a:buChar char="•"/>
+        <a:defRPr sz="3200" kern="1200">
           <a:solidFill>
             <a:schemeClr val="tx1"/>
           </a:solidFill>
@@ -3161,12 +2812,9 @@
         <a:spcBef>
           <a:spcPct val="20000"/>
         </a:spcBef>
-        <a:buClr>
-          <a:schemeClr val="tx2"/>
-        </a:buClr>
-        <a:buFont typeface="Wingdings" pitchFamily="2" charset="2"/>
-        <a:buChar char="§"/>
-        <a:defRPr sz="2400" kern="1200">
+        <a:buFont typeface="Arial" pitchFamily="34" charset="0"/>
+        <a:buChar char="–"/>
+        <a:defRPr sz="2800" kern="1200">
           <a:solidFill>
             <a:schemeClr val="tx1"/>
           </a:solidFill>
@@ -3179,12 +2827,9 @@
         <a:spcBef>
           <a:spcPct val="20000"/>
         </a:spcBef>
-        <a:buClr>
-          <a:schemeClr val="tx2"/>
-        </a:buClr>
-        <a:buFont typeface="Wingdings" pitchFamily="2" charset="2"/>
-        <a:buChar char="§"/>
-        <a:defRPr sz="2000" kern="1200">
+        <a:buFont typeface="Arial" pitchFamily="34" charset="0"/>
+        <a:buChar char="•"/>
+        <a:defRPr sz="2400" kern="1200">
           <a:solidFill>
             <a:schemeClr val="tx1"/>
           </a:solidFill>
@@ -3197,12 +2842,9 @@
         <a:spcBef>
           <a:spcPct val="20000"/>
         </a:spcBef>
-        <a:buClr>
-          <a:schemeClr val="tx2"/>
-        </a:buClr>
-        <a:buFont typeface="Wingdings" pitchFamily="2" charset="2"/>
-        <a:buChar char="§"/>
-        <a:defRPr sz="1800" kern="1200">
+        <a:buFont typeface="Arial" pitchFamily="34" charset="0"/>
+        <a:buChar char="–"/>
+        <a:defRPr sz="2000" kern="1200">
           <a:solidFill>
             <a:schemeClr val="tx1"/>
           </a:solidFill>
@@ -3215,12 +2857,9 @@
         <a:spcBef>
           <a:spcPct val="20000"/>
         </a:spcBef>
-        <a:buClr>
-          <a:schemeClr val="tx2"/>
-        </a:buClr>
-        <a:buFont typeface="Wingdings" pitchFamily="2" charset="2"/>
-        <a:buChar char="§"/>
-        <a:defRPr sz="1800" kern="1200">
+        <a:buFont typeface="Arial" pitchFamily="34" charset="0"/>
+        <a:buChar char="»"/>
+        <a:defRPr sz="2000" kern="1200">
           <a:solidFill>
             <a:schemeClr val="tx1"/>
           </a:solidFill>
@@ -3292,7 +2931,7 @@
     </p:bodyStyle>
     <p:otherStyle>
       <a:defPPr>
-        <a:defRPr lang="en-US"/>
+        <a:defRPr lang="zh-TW"/>
       </a:defPPr>
       <a:lvl1pPr marL="0" algn="l" defTabSz="914400" rtl="0" eaLnBrk="1" latinLnBrk="0" hangingPunct="1">
         <a:defRPr sz="1800" kern="1200">
@@ -3424,14 +3063,23 @@
           <a:lstStyle/>
           <a:p>
             <a:r>
-              <a:rPr lang="zh-TW" altLang="en-US" dirty="0"/>
+              <a:rPr lang="zh-TW" altLang="en-US" sz="4000" b="1" dirty="0">
+                <a:latin typeface="Microsoft JhengHei" pitchFamily="34" charset="-120"/>
+                <a:ea typeface="Microsoft JhengHei" pitchFamily="34" charset="-120"/>
+              </a:rPr>
               <a:t>主愛</a:t>
             </a:r>
             <a:r>
-              <a:rPr lang="zh-TW" altLang="en-US" dirty="0" smtClean="0"/>
+              <a:rPr lang="zh-TW" altLang="en-US" sz="4000" b="1" dirty="0" smtClean="0">
+                <a:latin typeface="Microsoft JhengHei" pitchFamily="34" charset="-120"/>
+                <a:ea typeface="Microsoft JhengHei" pitchFamily="34" charset="-120"/>
+              </a:rPr>
               <a:t>我</a:t>
             </a:r>
-            <a:endParaRPr lang="zh-TW" altLang="en-US" dirty="0"/>
+            <a:endParaRPr lang="zh-TW" altLang="en-US" sz="4000" b="1" dirty="0">
+              <a:latin typeface="Microsoft JhengHei" pitchFamily="34" charset="-120"/>
+              <a:ea typeface="Microsoft JhengHei" pitchFamily="34" charset="-120"/>
+            </a:endParaRPr>
           </a:p>
         </p:txBody>
       </p:sp>
@@ -3445,10 +3093,15 @@
             <p:ph idx="1"/>
           </p:nvPr>
         </p:nvSpPr>
-        <p:spPr/>
+        <p:spPr>
+          <a:xfrm>
+            <a:off x="0" y="1200151"/>
+            <a:ext cx="9144000" cy="3394472"/>
+          </a:xfrm>
+        </p:spPr>
         <p:txBody>
           <a:bodyPr>
-            <a:normAutofit/>
+            <a:noAutofit/>
           </a:bodyPr>
           <a:lstStyle/>
           <a:p>
@@ -3456,21 +3109,33 @@
               <a:buNone/>
             </a:pPr>
             <a:r>
-              <a:rPr lang="zh-TW" altLang="en-US" sz="5400" dirty="0"/>
+              <a:rPr lang="zh-TW" altLang="en-US" sz="4800" b="1" dirty="0">
+                <a:latin typeface="Microsoft JhengHei" pitchFamily="34" charset="-120"/>
+                <a:ea typeface="Microsoft JhengHei" pitchFamily="34" charset="-120"/>
+              </a:rPr>
               <a:t>生活世上幸福多</a:t>
             </a:r>
             <a:r>
-              <a:rPr lang="en-US" sz="5400" dirty="0"/>
+              <a:rPr lang="en-US" sz="4800" b="1" dirty="0">
+                <a:latin typeface="Microsoft JhengHei" pitchFamily="34" charset="-120"/>
+                <a:ea typeface="Microsoft JhengHei" pitchFamily="34" charset="-120"/>
+              </a:rPr>
               <a:t> </a:t>
             </a:r>
-            <a:endParaRPr lang="zh-TW" altLang="en-US" sz="5400" dirty="0"/>
+            <a:endParaRPr lang="zh-TW" altLang="en-US" sz="4800" b="1" dirty="0" smtClean="0">
+              <a:latin typeface="Microsoft JhengHei" pitchFamily="34" charset="-120"/>
+              <a:ea typeface="Microsoft JhengHei" pitchFamily="34" charset="-120"/>
+            </a:endParaRPr>
           </a:p>
           <a:p>
             <a:pPr algn="ctr">
               <a:buNone/>
             </a:pPr>
             <a:r>
-              <a:rPr lang="zh-TW" altLang="en-US" sz="5400" dirty="0"/>
+              <a:rPr lang="zh-TW" altLang="en-US" sz="4800" b="1" dirty="0" smtClean="0">
+                <a:latin typeface="Microsoft JhengHei" pitchFamily="34" charset="-120"/>
+                <a:ea typeface="Microsoft JhengHei" pitchFamily="34" charset="-120"/>
+              </a:rPr>
               <a:t>樣樣豐富主愛我</a:t>
             </a:r>
           </a:p>
@@ -3479,8 +3144,18 @@
               <a:buNone/>
             </a:pPr>
             <a:r>
-              <a:rPr lang="zh-TW" altLang="en-US" sz="5400" dirty="0"/>
-              <a:t>天父造人像首歌</a:t>
+              <a:rPr lang="zh-TW" altLang="en-US" sz="4800" b="1" dirty="0" smtClean="0">
+                <a:latin typeface="Microsoft JhengHei" pitchFamily="34" charset="-120"/>
+                <a:ea typeface="Microsoft JhengHei" pitchFamily="34" charset="-120"/>
+              </a:rPr>
+              <a:t>天</a:t>
+            </a:r>
+            <a:r>
+              <a:rPr lang="zh-TW" altLang="en-US" sz="4800" b="1" dirty="0">
+                <a:latin typeface="Microsoft JhengHei" pitchFamily="34" charset="-120"/>
+                <a:ea typeface="Microsoft JhengHei" pitchFamily="34" charset="-120"/>
+              </a:rPr>
+              <a:t>父造人像首歌</a:t>
             </a:r>
           </a:p>
           <a:p>
@@ -3488,11 +3163,17 @@
               <a:buNone/>
             </a:pPr>
             <a:r>
-              <a:rPr lang="zh-TW" altLang="en-US" sz="5400" dirty="0"/>
+              <a:rPr lang="zh-TW" altLang="en-US" sz="4800" b="1" dirty="0">
+                <a:latin typeface="Microsoft JhengHei" pitchFamily="34" charset="-120"/>
+                <a:ea typeface="Microsoft JhengHei" pitchFamily="34" charset="-120"/>
+              </a:rPr>
               <a:t>開心音符</a:t>
             </a:r>
             <a:r>
-              <a:rPr lang="zh-TW" altLang="en-US" sz="5400" dirty="0" smtClean="0"/>
+              <a:rPr lang="zh-TW" altLang="en-US" sz="4800" b="1" dirty="0" smtClean="0">
+                <a:latin typeface="Microsoft JhengHei" pitchFamily="34" charset="-120"/>
+                <a:ea typeface="Microsoft JhengHei" pitchFamily="34" charset="-120"/>
+              </a:rPr>
               <a:t>天天播</a:t>
             </a:r>
           </a:p>
@@ -3541,14 +3222,23 @@
           <a:lstStyle/>
           <a:p>
             <a:r>
-              <a:rPr lang="zh-TW" altLang="en-US" dirty="0"/>
+              <a:rPr lang="zh-TW" altLang="en-US" sz="4000" b="1" dirty="0">
+                <a:latin typeface="Microsoft JhengHei" pitchFamily="34" charset="-120"/>
+                <a:ea typeface="Microsoft JhengHei" pitchFamily="34" charset="-120"/>
+              </a:rPr>
               <a:t>主愛</a:t>
             </a:r>
             <a:r>
-              <a:rPr lang="zh-TW" altLang="en-US" dirty="0" smtClean="0"/>
+              <a:rPr lang="zh-TW" altLang="en-US" sz="4000" b="1" dirty="0">
+                <a:latin typeface="Microsoft JhengHei" pitchFamily="34" charset="-120"/>
+                <a:ea typeface="Microsoft JhengHei" pitchFamily="34" charset="-120"/>
+              </a:rPr>
               <a:t>我</a:t>
             </a:r>
-            <a:endParaRPr lang="zh-TW" altLang="en-US" dirty="0"/>
+            <a:endParaRPr lang="zh-TW" altLang="en-US" sz="4000" b="1" dirty="0">
+              <a:latin typeface="Microsoft JhengHei" pitchFamily="34" charset="-120"/>
+              <a:ea typeface="Microsoft JhengHei" pitchFamily="34" charset="-120"/>
+            </a:endParaRPr>
           </a:p>
         </p:txBody>
       </p:sp>
@@ -3565,7 +3255,7 @@
         <p:spPr/>
         <p:txBody>
           <a:bodyPr>
-            <a:normAutofit/>
+            <a:noAutofit/>
           </a:bodyPr>
           <a:lstStyle/>
           <a:p>
@@ -3573,8 +3263,25 @@
               <a:buNone/>
             </a:pPr>
             <a:r>
-              <a:rPr lang="zh-TW" altLang="en-US" sz="5400" dirty="0"/>
-              <a:t>星為我伴奏</a:t>
+              <a:rPr lang="zh-TW" altLang="en-US" sz="4800" b="1" dirty="0">
+                <a:latin typeface="Microsoft JhengHei" pitchFamily="34" charset="-120"/>
+                <a:ea typeface="Microsoft JhengHei" pitchFamily="34" charset="-120"/>
+              </a:rPr>
+              <a:t>星為我伴</a:t>
+            </a:r>
+            <a:r>
+              <a:rPr lang="zh-TW" altLang="en-US" sz="4800" b="1" dirty="0" smtClean="0">
+                <a:latin typeface="Microsoft JhengHei" pitchFamily="34" charset="-120"/>
+                <a:ea typeface="Microsoft JhengHei" pitchFamily="34" charset="-120"/>
+              </a:rPr>
+              <a:t>奏  風</a:t>
+            </a:r>
+            <a:r>
+              <a:rPr lang="zh-TW" altLang="en-US" sz="4800" b="1" dirty="0">
+                <a:latin typeface="Microsoft JhengHei" pitchFamily="34" charset="-120"/>
+                <a:ea typeface="Microsoft JhengHei" pitchFamily="34" charset="-120"/>
+              </a:rPr>
+              <a:t>跟我握手</a:t>
             </a:r>
           </a:p>
           <a:p>
@@ -3582,8 +3289,11 @@
               <a:buNone/>
             </a:pPr>
             <a:r>
-              <a:rPr lang="zh-TW" altLang="en-US" sz="5400" dirty="0"/>
-              <a:t>風跟我握手</a:t>
+              <a:rPr lang="zh-TW" altLang="en-US" sz="4800" b="1" dirty="0">
+                <a:latin typeface="Microsoft JhengHei" pitchFamily="34" charset="-120"/>
+                <a:ea typeface="Microsoft JhengHei" pitchFamily="34" charset="-120"/>
+              </a:rPr>
+              <a:t>天地海合奏</a:t>
             </a:r>
           </a:p>
           <a:p>
@@ -3591,19 +3301,16 @@
               <a:buNone/>
             </a:pPr>
             <a:r>
-              <a:rPr lang="zh-TW" altLang="en-US" sz="5400" dirty="0"/>
-              <a:t>天地海合奏</a:t>
-            </a:r>
-          </a:p>
-          <a:p>
-            <a:pPr algn="ctr">
-              <a:buNone/>
-            </a:pPr>
-            <a:r>
-              <a:rPr lang="zh-TW" altLang="en-US" sz="5400" dirty="0"/>
+              <a:rPr lang="zh-TW" altLang="en-US" sz="4800" b="1" dirty="0">
+                <a:latin typeface="Microsoft JhengHei" pitchFamily="34" charset="-120"/>
+                <a:ea typeface="Microsoft JhengHei" pitchFamily="34" charset="-120"/>
+              </a:rPr>
               <a:t>都表明主的愛</a:t>
             </a:r>
-            <a:endParaRPr lang="zh-TW" altLang="en-US" sz="5400" dirty="0" smtClean="0"/>
+            <a:endParaRPr lang="zh-TW" altLang="en-US" sz="4800" b="1" dirty="0">
+              <a:latin typeface="Microsoft JhengHei" pitchFamily="34" charset="-120"/>
+              <a:ea typeface="Microsoft JhengHei" pitchFamily="34" charset="-120"/>
+            </a:endParaRPr>
           </a:p>
         </p:txBody>
       </p:sp>
@@ -3616,62 +3323,62 @@
 </file>
 
 <file path=ppt/theme/theme1.xml><?xml version="1.0" encoding="utf-8"?>
-<a:theme xmlns:a="http://schemas.openxmlformats.org/drawingml/2006/main" name="佈景主題2">
+<a:theme xmlns:a="http://schemas.openxmlformats.org/drawingml/2006/main" name="Church Theme">
   <a:themeElements>
-    <a:clrScheme name="Slik-1">
+    <a:clrScheme name="Office">
       <a:dk1>
-        <a:srgbClr val="000000"/>
+        <a:sysClr val="windowText" lastClr="000000"/>
       </a:dk1>
       <a:lt1>
-        <a:srgbClr val="FFFFFF"/>
+        <a:sysClr val="window" lastClr="FFFFFF"/>
       </a:lt1>
       <a:dk2>
-        <a:srgbClr val="043988"/>
+        <a:srgbClr val="1F497D"/>
       </a:dk2>
       <a:lt2>
-        <a:srgbClr val="92C2EB"/>
+        <a:srgbClr val="EEECE1"/>
       </a:lt2>
       <a:accent1>
-        <a:srgbClr val="836AAE"/>
+        <a:srgbClr val="4F81BD"/>
       </a:accent1>
       <a:accent2>
-        <a:srgbClr val="5DA577"/>
+        <a:srgbClr val="C0504D"/>
       </a:accent2>
       <a:accent3>
-        <a:srgbClr val="678EB9"/>
+        <a:srgbClr val="9BBB59"/>
       </a:accent3>
       <a:accent4>
-        <a:srgbClr val="F7A611"/>
+        <a:srgbClr val="8064A2"/>
       </a:accent4>
       <a:accent5>
-        <a:srgbClr val="A1AB38"/>
+        <a:srgbClr val="4BACC6"/>
       </a:accent5>
       <a:accent6>
-        <a:srgbClr val="C17790"/>
+        <a:srgbClr val="F79646"/>
       </a:accent6>
       <a:hlink>
-        <a:srgbClr val="DA5723"/>
+        <a:srgbClr val="0000FF"/>
       </a:hlink>
       <a:folHlink>
-        <a:srgbClr val="226CA5"/>
+        <a:srgbClr val="800080"/>
       </a:folHlink>
     </a:clrScheme>
-    <a:fontScheme name="Slik-1">
+    <a:fontScheme name="Office">
       <a:majorFont>
-        <a:latin typeface="Arial"/>
+        <a:latin typeface="Calibri"/>
         <a:ea typeface=""/>
         <a:cs typeface=""/>
         <a:font script="Jpan" typeface="ＭＳ Ｐゴシック"/>
-        <a:font script="Hang" typeface="돋음"/>
-        <a:font script="Hans" typeface="方正姚体"/>
+        <a:font script="Hang" typeface="맑은 고딕"/>
+        <a:font script="Hans" typeface="宋体"/>
         <a:font script="Hant" typeface="新細明體"/>
-        <a:font script="Arab" typeface="Arial"/>
-        <a:font script="Hebr" typeface="Arial"/>
-        <a:font script="Thai" typeface="Cordia New"/>
+        <a:font script="Arab" typeface="Times New Roman"/>
+        <a:font script="Hebr" typeface="Times New Roman"/>
+        <a:font script="Thai" typeface="Angsana New"/>
         <a:font script="Ethi" typeface="Nyala"/>
         <a:font script="Beng" typeface="Vrinda"/>
         <a:font script="Gujr" typeface="Shruti"/>
-        <a:font script="Khmr" typeface="DaunPenh"/>
+        <a:font script="Khmr" typeface="MoolBoran"/>
         <a:font script="Knda" typeface="Tunga"/>
         <a:font script="Guru" typeface="Raavi"/>
         <a:font script="Cans" typeface="Euphemia"/>
@@ -3688,15 +3395,15 @@
         <a:font script="Laoo" typeface="DokChampa"/>
         <a:font script="Sinh" typeface="Iskoola Pota"/>
         <a:font script="Mong" typeface="Mongolian Baiti"/>
-        <a:font script="Viet" typeface="Arial"/>
+        <a:font script="Viet" typeface="Times New Roman"/>
         <a:font script="Uigh" typeface="Microsoft Uighur"/>
       </a:majorFont>
       <a:minorFont>
-        <a:latin typeface="Arial"/>
+        <a:latin typeface="Calibri"/>
         <a:ea typeface=""/>
         <a:cs typeface=""/>
         <a:font script="Jpan" typeface="ＭＳ Ｐゴシック"/>
-        <a:font script="Hang" typeface="돋음"/>
+        <a:font script="Hang" typeface="맑은 고딕"/>
         <a:font script="Hans" typeface="宋体"/>
         <a:font script="Hant" typeface="新細明體"/>
         <a:font script="Arab" typeface="Arial"/>
@@ -3726,7 +3433,7 @@
         <a:font script="Uigh" typeface="Microsoft Uighur"/>
       </a:minorFont>
     </a:fontScheme>
-    <a:fmtScheme name="Slik-1">
+    <a:fmtScheme name="Office">
       <a:fillStyleLst>
         <a:solidFill>
           <a:schemeClr val="phClr"/>
@@ -3735,71 +3442,56 @@
           <a:gsLst>
             <a:gs pos="0">
               <a:schemeClr val="phClr">
-                <a:tint val="20000"/>
-                <a:satMod val="250000"/>
+                <a:tint val="50000"/>
+                <a:satMod val="300000"/>
               </a:schemeClr>
             </a:gs>
-            <a:gs pos="30000">
+            <a:gs pos="35000">
               <a:schemeClr val="phClr">
-                <a:tint val="60000"/>
-                <a:satMod val="250000"/>
-              </a:schemeClr>
-            </a:gs>
-            <a:gs pos="50000">
-              <a:schemeClr val="phClr">
-                <a:tint val="57000"/>
-                <a:satMod val="250000"/>
+                <a:tint val="37000"/>
+                <a:satMod val="300000"/>
               </a:schemeClr>
             </a:gs>
             <a:gs pos="100000">
               <a:schemeClr val="phClr">
-                <a:tint val="28000"/>
-                <a:satMod val="250000"/>
+                <a:tint val="15000"/>
+                <a:satMod val="350000"/>
               </a:schemeClr>
             </a:gs>
           </a:gsLst>
-          <a:lin ang="6960000" scaled="1"/>
+          <a:lin ang="16200000" scaled="1"/>
         </a:gradFill>
         <a:gradFill rotWithShape="1">
           <a:gsLst>
             <a:gs pos="0">
               <a:schemeClr val="phClr">
-                <a:shade val="80000"/>
-                <a:satMod val="200000"/>
+                <a:shade val="51000"/>
+                <a:satMod val="130000"/>
               </a:schemeClr>
             </a:gs>
-            <a:gs pos="30000">
+            <a:gs pos="80000">
               <a:schemeClr val="phClr">
-                <a:shade val="20000"/>
-                <a:satMod val="250000"/>
-              </a:schemeClr>
-            </a:gs>
-            <a:gs pos="50000">
-              <a:schemeClr val="phClr">
-                <a:shade val="23000"/>
-                <a:satMod val="250000"/>
-              </a:schemeClr>
-            </a:gs>
-            <a:gs pos="60000">
-              <a:schemeClr val="phClr">
-                <a:shade val="29000"/>
-                <a:satMod val="230000"/>
+                <a:shade val="93000"/>
+                <a:satMod val="130000"/>
               </a:schemeClr>
             </a:gs>
             <a:gs pos="100000">
               <a:schemeClr val="phClr">
-                <a:shade val="70000"/>
-                <a:satMod val="200000"/>
+                <a:shade val="94000"/>
+                <a:satMod val="135000"/>
               </a:schemeClr>
             </a:gs>
           </a:gsLst>
-          <a:lin ang="6960000" scaled="1"/>
+          <a:lin ang="16200000" scaled="0"/>
         </a:gradFill>
       </a:fillStyleLst>
       <a:lnStyleLst>
-        <a:ln w="12700" cap="flat" cmpd="sng" algn="ctr">
+        <a:ln w="9525" cap="flat" cmpd="sng" algn="ctr">
           <a:solidFill>
-            <a:schemeClr val="phClr"/>
+            <a:schemeClr val="phClr">
+              <a:shade val="95000"/>
+              <a:satMod val="105000"/>
+            </a:schemeClr>
           </a:solidFill>
           <a:prstDash val="solid"/>
         </a:ln>
@@ -3809,7 +3501,7 @@
           </a:solidFill>
           <a:prstDash val="solid"/>
         </a:ln>
-        <a:ln w="31750" cap="flat" cmpd="sng" algn="ctr">
+        <a:ln w="38100" cap="flat" cmpd="sng" algn="ctr">
           <a:solidFill>
             <a:schemeClr val="phClr"/>
           </a:solidFill>
@@ -3819,7 +3511,16 @@
       <a:effectStyleLst>
         <a:effectStyle>
           <a:effectLst>
-            <a:outerShdw blurRad="63500" dist="50800" dir="5400000" algn="tl" rotWithShape="0">
+            <a:outerShdw blurRad="40000" dist="20000" dir="5400000" rotWithShape="0">
+              <a:srgbClr val="000000">
+                <a:alpha val="38000"/>
+              </a:srgbClr>
+            </a:outerShdw>
+          </a:effectLst>
+        </a:effectStyle>
+        <a:effectStyle>
+          <a:effectLst>
+            <a:outerShdw blurRad="40000" dist="23000" dir="5400000" rotWithShape="0">
               <a:srgbClr val="000000">
                 <a:alpha val="35000"/>
               </a:srgbClr>
@@ -3828,7 +3529,7 @@
         </a:effectStyle>
         <a:effectStyle>
           <a:effectLst>
-            <a:outerShdw blurRad="63500" dist="50800" dir="5400000" algn="tl" rotWithShape="0">
+            <a:outerShdw blurRad="40000" dist="23000" dir="5400000" rotWithShape="0">
               <a:srgbClr val="000000">
                 <a:alpha val="35000"/>
               </a:srgbClr>
@@ -3838,28 +3539,12 @@
             <a:camera prst="orthographicFront">
               <a:rot lat="0" lon="0" rev="0"/>
             </a:camera>
-            <a:lightRig rig="soft" dir="t"/>
+            <a:lightRig rig="threePt" dir="t">
+              <a:rot lat="0" lon="0" rev="1200000"/>
+            </a:lightRig>
           </a:scene3d>
           <a:sp3d>
-            <a:bevelT w="127000" h="12700"/>
-          </a:sp3d>
-        </a:effectStyle>
-        <a:effectStyle>
-          <a:effectLst>
-            <a:outerShdw blurRad="63500" dist="50800" dir="5400000" algn="tl" rotWithShape="0">
-              <a:srgbClr val="000000">
-                <a:alpha val="35000"/>
-              </a:srgbClr>
-            </a:outerShdw>
-          </a:effectLst>
-          <a:scene3d>
-            <a:camera prst="orthographicFront">
-              <a:rot lat="0" lon="0" rev="0"/>
-            </a:camera>
-            <a:lightRig rig="soft" dir="t"/>
-          </a:scene3d>
-          <a:sp3d>
-            <a:bevelT w="152400" h="25400"/>
+            <a:bevelT w="63500" h="25400"/>
           </a:sp3d>
         </a:effectStyle>
       </a:effectStyleLst>
@@ -3871,42 +3556,47 @@
           <a:gsLst>
             <a:gs pos="0">
               <a:schemeClr val="phClr">
-                <a:tint val="100000"/>
-                <a:shade val="50000"/>
-                <a:satMod val="150000"/>
+                <a:tint val="40000"/>
+                <a:satMod val="350000"/>
               </a:schemeClr>
             </a:gs>
-            <a:gs pos="50000">
+            <a:gs pos="40000">
               <a:schemeClr val="phClr">
-                <a:tint val="85000"/>
-                <a:shade val="100000"/>
-                <a:satMod val="140000"/>
+                <a:tint val="45000"/>
+                <a:shade val="99000"/>
+                <a:satMod val="350000"/>
               </a:schemeClr>
             </a:gs>
             <a:gs pos="100000">
               <a:schemeClr val="phClr">
-                <a:shade val="50000"/>
-                <a:satMod val="150000"/>
+                <a:shade val="20000"/>
+                <a:satMod val="255000"/>
               </a:schemeClr>
             </a:gs>
           </a:gsLst>
-          <a:lin ang="5400000" scaled="1"/>
+          <a:path path="circle">
+            <a:fillToRect l="50000" t="-80000" r="50000" b="180000"/>
+          </a:path>
         </a:gradFill>
-        <a:blipFill>
-          <a:blip xmlns:r="http://schemas.openxmlformats.org/officeDocument/2006/relationships" r:embed="rId1">
-            <a:duotone>
+        <a:gradFill rotWithShape="1">
+          <a:gsLst>
+            <a:gs pos="0">
               <a:schemeClr val="phClr">
-                <a:shade val="55000"/>
-                <a:satMod val="150000"/>
+                <a:tint val="80000"/>
+                <a:satMod val="300000"/>
               </a:schemeClr>
+            </a:gs>
+            <a:gs pos="100000">
               <a:schemeClr val="phClr">
-                <a:tint val="0"/>
-                <a:satMod val="150000"/>
+                <a:shade val="30000"/>
+                <a:satMod val="200000"/>
               </a:schemeClr>
-            </a:duotone>
-          </a:blip>
-          <a:stretch/>
-        </a:blipFill>
+            </a:gs>
+          </a:gsLst>
+          <a:path path="circle">
+            <a:fillToRect l="50000" t="50000" r="50000" b="50000"/>
+          </a:path>
+        </a:gradFill>
       </a:bgFillStyleLst>
     </a:fmtScheme>
   </a:themeElements>

</xml_diff>